<commit_message>
Adding Q2 and Q3 in pdf and adjusting the readme
</commit_message>
<xml_diff>
--- a/layout-draft.pptx
+++ b/layout-draft.pptx
@@ -5,32 +5,33 @@
     <p:sldMasterId id="2147483648" r:id="rId1"/>
   </p:sldMasterIdLst>
   <p:notesMasterIdLst>
-    <p:notesMasterId r:id="rId22"/>
+    <p:notesMasterId r:id="rId23"/>
   </p:notesMasterIdLst>
   <p:handoutMasterIdLst>
-    <p:handoutMasterId r:id="rId23"/>
+    <p:handoutMasterId r:id="rId24"/>
   </p:handoutMasterIdLst>
   <p:sldIdLst>
     <p:sldId id="257" r:id="rId2"/>
-    <p:sldId id="276" r:id="rId3"/>
-    <p:sldId id="258" r:id="rId4"/>
-    <p:sldId id="259" r:id="rId5"/>
-    <p:sldId id="260" r:id="rId6"/>
-    <p:sldId id="267" r:id="rId7"/>
-    <p:sldId id="262" r:id="rId8"/>
-    <p:sldId id="261" r:id="rId9"/>
-    <p:sldId id="272" r:id="rId10"/>
-    <p:sldId id="268" r:id="rId11"/>
-    <p:sldId id="273" r:id="rId12"/>
-    <p:sldId id="271" r:id="rId13"/>
-    <p:sldId id="274" r:id="rId14"/>
-    <p:sldId id="263" r:id="rId15"/>
-    <p:sldId id="264" r:id="rId16"/>
-    <p:sldId id="265" r:id="rId17"/>
-    <p:sldId id="266" r:id="rId18"/>
-    <p:sldId id="277" r:id="rId19"/>
-    <p:sldId id="279" r:id="rId20"/>
-    <p:sldId id="280" r:id="rId21"/>
+    <p:sldId id="282" r:id="rId3"/>
+    <p:sldId id="276" r:id="rId4"/>
+    <p:sldId id="258" r:id="rId5"/>
+    <p:sldId id="259" r:id="rId6"/>
+    <p:sldId id="260" r:id="rId7"/>
+    <p:sldId id="267" r:id="rId8"/>
+    <p:sldId id="262" r:id="rId9"/>
+    <p:sldId id="261" r:id="rId10"/>
+    <p:sldId id="272" r:id="rId11"/>
+    <p:sldId id="268" r:id="rId12"/>
+    <p:sldId id="273" r:id="rId13"/>
+    <p:sldId id="271" r:id="rId14"/>
+    <p:sldId id="274" r:id="rId15"/>
+    <p:sldId id="263" r:id="rId16"/>
+    <p:sldId id="264" r:id="rId17"/>
+    <p:sldId id="265" r:id="rId18"/>
+    <p:sldId id="266" r:id="rId19"/>
+    <p:sldId id="277" r:id="rId20"/>
+    <p:sldId id="279" r:id="rId21"/>
+    <p:sldId id="280" r:id="rId22"/>
   </p:sldIdLst>
   <p:sldSz cx="12192000" cy="6858000"/>
   <p:notesSz cx="6858000" cy="9144000"/>
@@ -234,7 +235,7 @@
           <a:p>
             <a:fld id="{753E72B4-C8EF-4A12-A461-F44FD7D04312}" type="datetimeFigureOut">
               <a:rPr lang="pt-BR" smtClean="0"/>
-              <a:t>17/06/2025</a:t>
+              <a:t>22/06/2025</a:t>
             </a:fld>
             <a:endParaRPr lang="pt-BR"/>
           </a:p>
@@ -411,7 +412,7 @@
           <a:p>
             <a:fld id="{1D79DA06-7354-43A9-BD68-58750EF73857}" type="datetimeFigureOut">
               <a:rPr lang="pt-BR" smtClean="0"/>
-              <a:t>17/06/2025</a:t>
+              <a:t>22/06/2025</a:t>
             </a:fld>
             <a:endParaRPr lang="pt-BR"/>
           </a:p>
@@ -799,7 +800,7 @@
           <a:lstStyle/>
           <a:p>
             <a:pPr algn="ctr"/>
-            <a:endParaRPr lang="pt-BR"/>
+            <a:endParaRPr lang="pt-BR" dirty="0"/>
           </a:p>
         </p:txBody>
       </p:sp>
@@ -1063,7 +1064,7 @@
           <a:p>
             <a:fld id="{CDDAEB87-71B3-4B99-AD74-53172E823254}" type="datetimeFigureOut">
               <a:rPr lang="pt-BR" smtClean="0"/>
-              <a:t>17/06/2025</a:t>
+              <a:t>22/06/2025</a:t>
             </a:fld>
             <a:endParaRPr lang="pt-BR"/>
           </a:p>
@@ -1483,61 +1484,6 @@
       </p:grpSpPr>
       <p:sp>
         <p:nvSpPr>
-          <p:cNvPr id="27" name="Rectangle 26">
-            <a:extLst>
-              <a:ext uri="{FF2B5EF4-FFF2-40B4-BE49-F238E27FC236}">
-                <a16:creationId xmlns:a16="http://schemas.microsoft.com/office/drawing/2014/main" id="{78C38942-E4A4-827D-9E0D-8E18E123006E}"/>
-              </a:ext>
-            </a:extLst>
-          </p:cNvPr>
-          <p:cNvSpPr/>
-          <p:nvPr/>
-        </p:nvSpPr>
-        <p:spPr>
-          <a:xfrm>
-            <a:off x="2686125" y="1501460"/>
-            <a:ext cx="8912027" cy="4987269"/>
-          </a:xfrm>
-          <a:prstGeom prst="rect">
-            <a:avLst/>
-          </a:prstGeom>
-          <a:solidFill>
-            <a:schemeClr val="bg1"/>
-          </a:solidFill>
-          <a:ln>
-            <a:noFill/>
-          </a:ln>
-          <a:effectLst>
-            <a:softEdge rad="0"/>
-          </a:effectLst>
-        </p:spPr>
-        <p:style>
-          <a:lnRef idx="2">
-            <a:schemeClr val="accent1">
-              <a:shade val="15000"/>
-            </a:schemeClr>
-          </a:lnRef>
-          <a:fillRef idx="1">
-            <a:schemeClr val="accent1"/>
-          </a:fillRef>
-          <a:effectRef idx="0">
-            <a:schemeClr val="accent1"/>
-          </a:effectRef>
-          <a:fontRef idx="minor">
-            <a:schemeClr val="lt1"/>
-          </a:fontRef>
-        </p:style>
-        <p:txBody>
-          <a:bodyPr rtlCol="0" anchor="ctr"/>
-          <a:lstStyle/>
-          <a:p>
-            <a:pPr algn="ctr"/>
-            <a:endParaRPr lang="pt-BR" dirty="0"/>
-          </a:p>
-        </p:txBody>
-      </p:sp>
-      <p:sp>
-        <p:nvSpPr>
           <p:cNvPr id="22" name="Rectangle 21">
             <a:extLst>
               <a:ext uri="{FF2B5EF4-FFF2-40B4-BE49-F238E27FC236}">
@@ -2131,10 +2077,213 @@
       </p:sp>
       <p:sp>
         <p:nvSpPr>
-          <p:cNvPr id="28" name="Oval 27">
-            <a:extLst>
-              <a:ext uri="{FF2B5EF4-FFF2-40B4-BE49-F238E27FC236}">
-                <a16:creationId xmlns:a16="http://schemas.microsoft.com/office/drawing/2014/main" id="{ED3C832F-FED8-B010-49CC-D5DC64B5DD18}"/>
+          <p:cNvPr id="32" name="TextBox 31">
+            <a:extLst>
+              <a:ext uri="{FF2B5EF4-FFF2-40B4-BE49-F238E27FC236}">
+                <a16:creationId xmlns:a16="http://schemas.microsoft.com/office/drawing/2014/main" id="{1DBABAF1-8ED0-88B4-8CB7-E6036BABB6AA}"/>
+              </a:ext>
+            </a:extLst>
+          </p:cNvPr>
+          <p:cNvSpPr txBox="1"/>
+          <p:nvPr/>
+        </p:nvSpPr>
+        <p:spPr>
+          <a:xfrm>
+            <a:off x="3413251" y="926921"/>
+            <a:ext cx="1848583" cy="307777"/>
+          </a:xfrm>
+          <a:prstGeom prst="rect">
+            <a:avLst/>
+          </a:prstGeom>
+          <a:noFill/>
+        </p:spPr>
+        <p:txBody>
+          <a:bodyPr wrap="none" rtlCol="0">
+            <a:spAutoFit/>
+          </a:bodyPr>
+          <a:lstStyle/>
+          <a:p>
+            <a:r>
+              <a:rPr lang="pt-BR" sz="1400" b="1" dirty="0">
+                <a:latin typeface="Roboto" panose="02000000000000000000" pitchFamily="2" charset="0"/>
+                <a:ea typeface="Roboto" panose="02000000000000000000" pitchFamily="2" charset="0"/>
+              </a:rPr>
+              <a:t>Welcome back, </a:t>
+            </a:r>
+            <a:r>
+              <a:rPr lang="pt-BR" sz="1400" dirty="0">
+                <a:latin typeface="Roboto" panose="02000000000000000000" pitchFamily="2" charset="0"/>
+                <a:ea typeface="Roboto" panose="02000000000000000000" pitchFamily="2" charset="0"/>
+              </a:rPr>
+              <a:t>user</a:t>
+            </a:r>
+            <a:r>
+              <a:rPr lang="pt-BR" sz="1400" b="1" dirty="0">
+                <a:latin typeface="Roboto" panose="02000000000000000000" pitchFamily="2" charset="0"/>
+                <a:ea typeface="Roboto" panose="02000000000000000000" pitchFamily="2" charset="0"/>
+              </a:rPr>
+              <a:t>!</a:t>
+            </a:r>
+            <a:endParaRPr lang="pt-BR" sz="1200" b="1" dirty="0">
+              <a:latin typeface="Roboto" panose="02000000000000000000" pitchFamily="2" charset="0"/>
+              <a:ea typeface="Roboto" panose="02000000000000000000" pitchFamily="2" charset="0"/>
+            </a:endParaRPr>
+          </a:p>
+        </p:txBody>
+      </p:sp>
+      <p:grpSp>
+        <p:nvGrpSpPr>
+          <p:cNvPr id="34" name="Group 33">
+            <a:extLst>
+              <a:ext uri="{FF2B5EF4-FFF2-40B4-BE49-F238E27FC236}">
+                <a16:creationId xmlns:a16="http://schemas.microsoft.com/office/drawing/2014/main" id="{A4BD69CB-D1D0-8F4D-CE4A-51F4C05AE27C}"/>
+              </a:ext>
+            </a:extLst>
+          </p:cNvPr>
+          <p:cNvGrpSpPr>
+            <a:grpSpLocks noChangeAspect="1"/>
+          </p:cNvGrpSpPr>
+          <p:nvPr/>
+        </p:nvGrpSpPr>
+        <p:grpSpPr>
+          <a:xfrm>
+            <a:off x="2595324" y="732869"/>
+            <a:ext cx="694767" cy="695882"/>
+            <a:chOff x="2825624" y="798218"/>
+            <a:chExt cx="2666373" cy="2670654"/>
+          </a:xfrm>
+        </p:grpSpPr>
+        <p:sp>
+          <p:nvSpPr>
+            <p:cNvPr id="28" name="Oval 27">
+              <a:extLst>
+                <a:ext uri="{FF2B5EF4-FFF2-40B4-BE49-F238E27FC236}">
+                  <a16:creationId xmlns:a16="http://schemas.microsoft.com/office/drawing/2014/main" id="{ED3C832F-FED8-B010-49CC-D5DC64B5DD18}"/>
+                </a:ext>
+              </a:extLst>
+            </p:cNvPr>
+            <p:cNvSpPr/>
+            <p:nvPr/>
+          </p:nvSpPr>
+          <p:spPr>
+            <a:xfrm>
+              <a:off x="2825624" y="802499"/>
+              <a:ext cx="2666373" cy="2666373"/>
+            </a:xfrm>
+            <a:prstGeom prst="ellipse">
+              <a:avLst/>
+            </a:prstGeom>
+            <a:solidFill>
+              <a:srgbClr val="E2E2E2"/>
+            </a:solidFill>
+            <a:ln>
+              <a:noFill/>
+            </a:ln>
+          </p:spPr>
+          <p:style>
+            <a:lnRef idx="2">
+              <a:schemeClr val="accent1">
+                <a:shade val="15000"/>
+              </a:schemeClr>
+            </a:lnRef>
+            <a:fillRef idx="1">
+              <a:schemeClr val="accent1"/>
+            </a:fillRef>
+            <a:effectRef idx="0">
+              <a:schemeClr val="accent1"/>
+            </a:effectRef>
+            <a:fontRef idx="minor">
+              <a:schemeClr val="lt1"/>
+            </a:fontRef>
+          </p:style>
+          <p:txBody>
+            <a:bodyPr rtlCol="0" anchor="ctr"/>
+            <a:lstStyle/>
+            <a:p>
+              <a:pPr algn="ctr"/>
+              <a:endParaRPr lang="pt-BR"/>
+            </a:p>
+          </p:txBody>
+        </p:sp>
+        <p:pic>
+          <p:nvPicPr>
+            <p:cNvPr id="33" name="Graphic 32" descr="User with solid fill">
+              <a:extLst>
+                <a:ext uri="{FF2B5EF4-FFF2-40B4-BE49-F238E27FC236}">
+                  <a16:creationId xmlns:a16="http://schemas.microsoft.com/office/drawing/2014/main" id="{3E16317F-CD1C-0F01-7422-B54AA8C24897}"/>
+                </a:ext>
+              </a:extLst>
+            </p:cNvPr>
+            <p:cNvPicPr>
+              <a:picLocks noChangeAspect="1"/>
+            </p:cNvPicPr>
+            <p:nvPr/>
+          </p:nvPicPr>
+          <p:blipFill>
+            <a:blip r:embed="rId12">
+              <a:extLst>
+                <a:ext uri="{96DAC541-7B7A-43D3-8B79-37D633B846F1}">
+                  <asvg:svgBlip xmlns:asvg="http://schemas.microsoft.com/office/drawing/2016/SVG/main" r:embed="rId13"/>
+                </a:ext>
+              </a:extLst>
+            </a:blip>
+            <a:stretch>
+              <a:fillRect/>
+            </a:stretch>
+          </p:blipFill>
+          <p:spPr>
+            <a:xfrm>
+              <a:off x="2901931" y="798218"/>
+              <a:ext cx="2513758" cy="2513758"/>
+            </a:xfrm>
+            <a:prstGeom prst="rect">
+              <a:avLst/>
+            </a:prstGeom>
+          </p:spPr>
+        </p:pic>
+      </p:grpSp>
+    </p:spTree>
+    <p:extLst>
+      <p:ext uri="{BB962C8B-B14F-4D97-AF65-F5344CB8AC3E}">
+        <p14:creationId xmlns:p14="http://schemas.microsoft.com/office/powerpoint/2010/main" val="4227888350"/>
+      </p:ext>
+    </p:extLst>
+  </p:cSld>
+  <p:clrMapOvr>
+    <a:masterClrMapping/>
+  </p:clrMapOvr>
+</p:sld>
+</file>
+
+<file path=ppt/slides/slide10.xml><?xml version="1.0" encoding="utf-8"?>
+<p:sld xmlns:a="http://schemas.openxmlformats.org/drawingml/2006/main" xmlns:r="http://schemas.openxmlformats.org/officeDocument/2006/relationships" xmlns:p="http://schemas.openxmlformats.org/presentationml/2006/main">
+  <p:cSld>
+    <p:spTree>
+      <p:nvGrpSpPr>
+        <p:cNvPr id="1" name="">
+          <a:extLst>
+            <a:ext uri="{FF2B5EF4-FFF2-40B4-BE49-F238E27FC236}">
+              <a16:creationId xmlns:a16="http://schemas.microsoft.com/office/drawing/2014/main" id="{86135AA5-CB4E-B8BE-5A68-4341B3B7D8E0}"/>
+            </a:ext>
+          </a:extLst>
+        </p:cNvPr>
+        <p:cNvGrpSpPr/>
+        <p:nvPr/>
+      </p:nvGrpSpPr>
+      <p:grpSpPr>
+        <a:xfrm>
+          <a:off x="0" y="0"/>
+          <a:ext cx="0" cy="0"/>
+          <a:chOff x="0" y="0"/>
+          <a:chExt cx="0" cy="0"/>
+        </a:xfrm>
+      </p:grpSpPr>
+      <p:sp>
+        <p:nvSpPr>
+          <p:cNvPr id="5" name="Right Triangle 4">
+            <a:extLst>
+              <a:ext uri="{FF2B5EF4-FFF2-40B4-BE49-F238E27FC236}">
+                <a16:creationId xmlns:a16="http://schemas.microsoft.com/office/drawing/2014/main" id="{D6E8A70F-18F7-7E41-5B47-F936A140C395}"/>
               </a:ext>
             </a:extLst>
           </p:cNvPr>
@@ -2142,15 +2291,15 @@
           <p:nvPr/>
         </p:nvSpPr>
         <p:spPr>
-          <a:xfrm>
-            <a:off x="2825625" y="802500"/>
-            <a:ext cx="540000" cy="540000"/>
-          </a:xfrm>
-          <a:prstGeom prst="ellipse">
+          <a:xfrm rot="16200000">
+            <a:off x="3731503" y="1310407"/>
+            <a:ext cx="2029693" cy="2004292"/>
+          </a:xfrm>
+          <a:prstGeom prst="rtTriangle">
             <a:avLst/>
           </a:prstGeom>
           <a:solidFill>
-            <a:srgbClr val="E2E2E2"/>
+            <a:srgbClr val="075293"/>
           </a:solidFill>
           <a:ln>
             <a:noFill/>
@@ -2181,12 +2330,544 @@
           </a:p>
         </p:txBody>
       </p:sp>
+      <p:sp>
+        <p:nvSpPr>
+          <p:cNvPr id="6" name="Right Triangle 5">
+            <a:extLst>
+              <a:ext uri="{FF2B5EF4-FFF2-40B4-BE49-F238E27FC236}">
+                <a16:creationId xmlns:a16="http://schemas.microsoft.com/office/drawing/2014/main" id="{930B1128-E06A-59A0-565D-554A1343F5DA}"/>
+              </a:ext>
+            </a:extLst>
+          </p:cNvPr>
+          <p:cNvSpPr/>
+          <p:nvPr/>
+        </p:nvSpPr>
+        <p:spPr>
+          <a:xfrm>
+            <a:off x="6206837" y="1310407"/>
+            <a:ext cx="2029693" cy="2004292"/>
+          </a:xfrm>
+          <a:prstGeom prst="rtTriangle">
+            <a:avLst/>
+          </a:prstGeom>
+          <a:solidFill>
+            <a:srgbClr val="DF1E37"/>
+          </a:solidFill>
+          <a:ln>
+            <a:noFill/>
+          </a:ln>
+        </p:spPr>
+        <p:style>
+          <a:lnRef idx="2">
+            <a:schemeClr val="accent1">
+              <a:shade val="15000"/>
+            </a:schemeClr>
+          </a:lnRef>
+          <a:fillRef idx="1">
+            <a:schemeClr val="accent1"/>
+          </a:fillRef>
+          <a:effectRef idx="0">
+            <a:schemeClr val="accent1"/>
+          </a:effectRef>
+          <a:fontRef idx="minor">
+            <a:schemeClr val="lt1"/>
+          </a:fontRef>
+        </p:style>
+        <p:txBody>
+          <a:bodyPr rtlCol="0" anchor="ctr"/>
+          <a:lstStyle/>
+          <a:p>
+            <a:pPr algn="ctr"/>
+            <a:endParaRPr lang="pt-BR"/>
+          </a:p>
+        </p:txBody>
+      </p:sp>
+      <p:sp>
+        <p:nvSpPr>
+          <p:cNvPr id="7" name="Right Triangle 6">
+            <a:extLst>
+              <a:ext uri="{FF2B5EF4-FFF2-40B4-BE49-F238E27FC236}">
+                <a16:creationId xmlns:a16="http://schemas.microsoft.com/office/drawing/2014/main" id="{FE374D57-B886-D577-0EB6-8317060A19B3}"/>
+              </a:ext>
+            </a:extLst>
+          </p:cNvPr>
+          <p:cNvSpPr/>
+          <p:nvPr/>
+        </p:nvSpPr>
+        <p:spPr>
+          <a:xfrm rot="5400000">
+            <a:off x="6219537" y="3707243"/>
+            <a:ext cx="2029693" cy="2004292"/>
+          </a:xfrm>
+          <a:prstGeom prst="rtTriangle">
+            <a:avLst/>
+          </a:prstGeom>
+          <a:solidFill>
+            <a:schemeClr val="bg1">
+              <a:lumMod val="75000"/>
+            </a:schemeClr>
+          </a:solidFill>
+          <a:ln>
+            <a:noFill/>
+          </a:ln>
+        </p:spPr>
+        <p:style>
+          <a:lnRef idx="2">
+            <a:schemeClr val="accent1">
+              <a:shade val="15000"/>
+            </a:schemeClr>
+          </a:lnRef>
+          <a:fillRef idx="1">
+            <a:schemeClr val="accent1"/>
+          </a:fillRef>
+          <a:effectRef idx="0">
+            <a:schemeClr val="accent1"/>
+          </a:effectRef>
+          <a:fontRef idx="minor">
+            <a:schemeClr val="lt1"/>
+          </a:fontRef>
+        </p:style>
+        <p:txBody>
+          <a:bodyPr rtlCol="0" anchor="ctr"/>
+          <a:lstStyle/>
+          <a:p>
+            <a:pPr algn="ctr"/>
+            <a:endParaRPr lang="pt-BR"/>
+          </a:p>
+        </p:txBody>
+      </p:sp>
+      <p:sp>
+        <p:nvSpPr>
+          <p:cNvPr id="8" name="Right Triangle 7">
+            <a:extLst>
+              <a:ext uri="{FF2B5EF4-FFF2-40B4-BE49-F238E27FC236}">
+                <a16:creationId xmlns:a16="http://schemas.microsoft.com/office/drawing/2014/main" id="{62ACB4C3-5703-E06B-EAB1-279341C8BDA3}"/>
+              </a:ext>
+            </a:extLst>
+          </p:cNvPr>
+          <p:cNvSpPr/>
+          <p:nvPr/>
+        </p:nvSpPr>
+        <p:spPr>
+          <a:xfrm rot="10800000">
+            <a:off x="3744203" y="3707243"/>
+            <a:ext cx="2029693" cy="2004292"/>
+          </a:xfrm>
+          <a:prstGeom prst="rtTriangle">
+            <a:avLst/>
+          </a:prstGeom>
+          <a:solidFill>
+            <a:schemeClr val="tx1"/>
+          </a:solidFill>
+          <a:ln>
+            <a:noFill/>
+          </a:ln>
+        </p:spPr>
+        <p:style>
+          <a:lnRef idx="2">
+            <a:schemeClr val="accent1">
+              <a:shade val="15000"/>
+            </a:schemeClr>
+          </a:lnRef>
+          <a:fillRef idx="1">
+            <a:schemeClr val="accent1"/>
+          </a:fillRef>
+          <a:effectRef idx="0">
+            <a:schemeClr val="accent1"/>
+          </a:effectRef>
+          <a:fontRef idx="minor">
+            <a:schemeClr val="lt1"/>
+          </a:fontRef>
+        </p:style>
+        <p:txBody>
+          <a:bodyPr rtlCol="0" anchor="ctr"/>
+          <a:lstStyle/>
+          <a:p>
+            <a:pPr algn="ctr"/>
+            <a:endParaRPr lang="pt-BR"/>
+          </a:p>
+        </p:txBody>
+      </p:sp>
+      <p:sp>
+        <p:nvSpPr>
+          <p:cNvPr id="10" name="TextBox 9">
+            <a:extLst>
+              <a:ext uri="{FF2B5EF4-FFF2-40B4-BE49-F238E27FC236}">
+                <a16:creationId xmlns:a16="http://schemas.microsoft.com/office/drawing/2014/main" id="{E5D244E8-C342-F407-7408-1A65446E0460}"/>
+              </a:ext>
+            </a:extLst>
+          </p:cNvPr>
+          <p:cNvSpPr txBox="1"/>
+          <p:nvPr/>
+        </p:nvSpPr>
+        <p:spPr>
+          <a:xfrm>
+            <a:off x="4858328" y="2312553"/>
+            <a:ext cx="532518" cy="769441"/>
+          </a:xfrm>
+          <a:prstGeom prst="rect">
+            <a:avLst/>
+          </a:prstGeom>
+          <a:noFill/>
+        </p:spPr>
+        <p:txBody>
+          <a:bodyPr wrap="none" rtlCol="0">
+            <a:spAutoFit/>
+          </a:bodyPr>
+          <a:lstStyle/>
+          <a:p>
+            <a:r>
+              <a:rPr lang="pt-BR" sz="4400" b="1" dirty="0">
+                <a:solidFill>
+                  <a:schemeClr val="bg1"/>
+                </a:solidFill>
+                <a:latin typeface="Roboto" panose="02000000000000000000" pitchFamily="2" charset="0"/>
+                <a:ea typeface="Roboto" panose="02000000000000000000" pitchFamily="2" charset="0"/>
+              </a:rPr>
+              <a:t>S</a:t>
+            </a:r>
+          </a:p>
+        </p:txBody>
+      </p:sp>
+      <p:sp>
+        <p:nvSpPr>
+          <p:cNvPr id="11" name="TextBox 10">
+            <a:extLst>
+              <a:ext uri="{FF2B5EF4-FFF2-40B4-BE49-F238E27FC236}">
+                <a16:creationId xmlns:a16="http://schemas.microsoft.com/office/drawing/2014/main" id="{D13C3C0F-6E19-911B-3896-1D68977DBBA1}"/>
+              </a:ext>
+            </a:extLst>
+          </p:cNvPr>
+          <p:cNvSpPr txBox="1"/>
+          <p:nvPr/>
+        </p:nvSpPr>
+        <p:spPr>
+          <a:xfrm>
+            <a:off x="6504971" y="2312552"/>
+            <a:ext cx="599844" cy="769441"/>
+          </a:xfrm>
+          <a:prstGeom prst="rect">
+            <a:avLst/>
+          </a:prstGeom>
+          <a:noFill/>
+        </p:spPr>
+        <p:txBody>
+          <a:bodyPr wrap="none" rtlCol="0">
+            <a:spAutoFit/>
+          </a:bodyPr>
+          <a:lstStyle/>
+          <a:p>
+            <a:r>
+              <a:rPr lang="pt-BR" sz="4400" b="1" dirty="0">
+                <a:solidFill>
+                  <a:schemeClr val="bg1"/>
+                </a:solidFill>
+                <a:latin typeface="Roboto" panose="02000000000000000000" pitchFamily="2" charset="0"/>
+                <a:ea typeface="Roboto" panose="02000000000000000000" pitchFamily="2" charset="0"/>
+              </a:rPr>
+              <a:t>w</a:t>
+            </a:r>
+          </a:p>
+        </p:txBody>
+      </p:sp>
+      <p:sp>
+        <p:nvSpPr>
+          <p:cNvPr id="12" name="TextBox 11">
+            <a:extLst>
+              <a:ext uri="{FF2B5EF4-FFF2-40B4-BE49-F238E27FC236}">
+                <a16:creationId xmlns:a16="http://schemas.microsoft.com/office/drawing/2014/main" id="{47B6A405-19C6-5342-D237-A2821080F0E0}"/>
+              </a:ext>
+            </a:extLst>
+          </p:cNvPr>
+          <p:cNvSpPr txBox="1"/>
+          <p:nvPr/>
+        </p:nvSpPr>
+        <p:spPr>
+          <a:xfrm>
+            <a:off x="4918820" y="3957527"/>
+            <a:ext cx="534121" cy="769441"/>
+          </a:xfrm>
+          <a:prstGeom prst="rect">
+            <a:avLst/>
+          </a:prstGeom>
+          <a:noFill/>
+        </p:spPr>
+        <p:txBody>
+          <a:bodyPr wrap="none" rtlCol="0">
+            <a:spAutoFit/>
+          </a:bodyPr>
+          <a:lstStyle/>
+          <a:p>
+            <a:r>
+              <a:rPr lang="pt-BR" sz="4400" b="1" dirty="0">
+                <a:solidFill>
+                  <a:schemeClr val="bg1"/>
+                </a:solidFill>
+                <a:latin typeface="Roboto" panose="02000000000000000000" pitchFamily="2" charset="0"/>
+                <a:ea typeface="Roboto" panose="02000000000000000000" pitchFamily="2" charset="0"/>
+              </a:rPr>
+              <a:t>T</a:t>
+            </a:r>
+          </a:p>
+        </p:txBody>
+      </p:sp>
+      <p:sp>
+        <p:nvSpPr>
+          <p:cNvPr id="13" name="TextBox 12">
+            <a:extLst>
+              <a:ext uri="{FF2B5EF4-FFF2-40B4-BE49-F238E27FC236}">
+                <a16:creationId xmlns:a16="http://schemas.microsoft.com/office/drawing/2014/main" id="{770DDF39-DF0E-5863-0975-BA2BD2DA6709}"/>
+              </a:ext>
+            </a:extLst>
+          </p:cNvPr>
+          <p:cNvSpPr txBox="1"/>
+          <p:nvPr/>
+        </p:nvSpPr>
+        <p:spPr>
+          <a:xfrm>
+            <a:off x="6565463" y="3957526"/>
+            <a:ext cx="574196" cy="769441"/>
+          </a:xfrm>
+          <a:prstGeom prst="rect">
+            <a:avLst/>
+          </a:prstGeom>
+          <a:noFill/>
+        </p:spPr>
+        <p:txBody>
+          <a:bodyPr wrap="none" rtlCol="0">
+            <a:spAutoFit/>
+          </a:bodyPr>
+          <a:lstStyle/>
+          <a:p>
+            <a:r>
+              <a:rPr lang="pt-BR" sz="4400" b="1" dirty="0">
+                <a:solidFill>
+                  <a:schemeClr val="bg1"/>
+                </a:solidFill>
+                <a:latin typeface="Roboto" panose="02000000000000000000" pitchFamily="2" charset="0"/>
+                <a:ea typeface="Roboto" panose="02000000000000000000" pitchFamily="2" charset="0"/>
+              </a:rPr>
+              <a:t>O</a:t>
+            </a:r>
+          </a:p>
+        </p:txBody>
+      </p:sp>
+      <p:sp>
+        <p:nvSpPr>
+          <p:cNvPr id="14" name="Oval 13">
+            <a:extLst>
+              <a:ext uri="{FF2B5EF4-FFF2-40B4-BE49-F238E27FC236}">
+                <a16:creationId xmlns:a16="http://schemas.microsoft.com/office/drawing/2014/main" id="{ACEC257B-70FF-BF6C-25C9-9A7691578F0D}"/>
+              </a:ext>
+            </a:extLst>
+          </p:cNvPr>
+          <p:cNvSpPr/>
+          <p:nvPr/>
+        </p:nvSpPr>
+        <p:spPr>
+          <a:xfrm>
+            <a:off x="235966" y="248226"/>
+            <a:ext cx="720000" cy="720000"/>
+          </a:xfrm>
+          <a:prstGeom prst="ellipse">
+            <a:avLst/>
+          </a:prstGeom>
+          <a:solidFill>
+            <a:srgbClr val="075293"/>
+          </a:solidFill>
+          <a:ln>
+            <a:noFill/>
+          </a:ln>
+        </p:spPr>
+        <p:style>
+          <a:lnRef idx="2">
+            <a:schemeClr val="accent1">
+              <a:shade val="15000"/>
+            </a:schemeClr>
+          </a:lnRef>
+          <a:fillRef idx="1">
+            <a:schemeClr val="accent1"/>
+          </a:fillRef>
+          <a:effectRef idx="0">
+            <a:schemeClr val="accent1"/>
+          </a:effectRef>
+          <a:fontRef idx="minor">
+            <a:schemeClr val="lt1"/>
+          </a:fontRef>
+        </p:style>
+        <p:txBody>
+          <a:bodyPr rtlCol="0" anchor="ctr"/>
+          <a:lstStyle/>
+          <a:p>
+            <a:pPr algn="ctr"/>
+            <a:endParaRPr lang="pt-BR"/>
+          </a:p>
+        </p:txBody>
+      </p:sp>
+      <p:sp>
+        <p:nvSpPr>
+          <p:cNvPr id="15" name="Oval 14">
+            <a:extLst>
+              <a:ext uri="{FF2B5EF4-FFF2-40B4-BE49-F238E27FC236}">
+                <a16:creationId xmlns:a16="http://schemas.microsoft.com/office/drawing/2014/main" id="{C9E96107-3064-0949-D1A1-553C0F9846D6}"/>
+              </a:ext>
+            </a:extLst>
+          </p:cNvPr>
+          <p:cNvSpPr/>
+          <p:nvPr/>
+        </p:nvSpPr>
+        <p:spPr>
+          <a:xfrm>
+            <a:off x="11282216" y="248226"/>
+            <a:ext cx="720000" cy="720000"/>
+          </a:xfrm>
+          <a:prstGeom prst="ellipse">
+            <a:avLst/>
+          </a:prstGeom>
+          <a:solidFill>
+            <a:srgbClr val="DF1E37"/>
+          </a:solidFill>
+          <a:ln>
+            <a:noFill/>
+          </a:ln>
+        </p:spPr>
+        <p:style>
+          <a:lnRef idx="2">
+            <a:schemeClr val="accent1">
+              <a:shade val="15000"/>
+            </a:schemeClr>
+          </a:lnRef>
+          <a:fillRef idx="1">
+            <a:schemeClr val="accent1"/>
+          </a:fillRef>
+          <a:effectRef idx="0">
+            <a:schemeClr val="accent1"/>
+          </a:effectRef>
+          <a:fontRef idx="minor">
+            <a:schemeClr val="lt1"/>
+          </a:fontRef>
+        </p:style>
+        <p:txBody>
+          <a:bodyPr rtlCol="0" anchor="ctr"/>
+          <a:lstStyle/>
+          <a:p>
+            <a:pPr algn="ctr"/>
+            <a:endParaRPr lang="pt-BR"/>
+          </a:p>
+        </p:txBody>
+      </p:sp>
+      <p:sp>
+        <p:nvSpPr>
+          <p:cNvPr id="16" name="Oval 15">
+            <a:extLst>
+              <a:ext uri="{FF2B5EF4-FFF2-40B4-BE49-F238E27FC236}">
+                <a16:creationId xmlns:a16="http://schemas.microsoft.com/office/drawing/2014/main" id="{27BC21C0-4D37-6E62-DFEC-87552D47471C}"/>
+              </a:ext>
+            </a:extLst>
+          </p:cNvPr>
+          <p:cNvSpPr/>
+          <p:nvPr/>
+        </p:nvSpPr>
+        <p:spPr>
+          <a:xfrm>
+            <a:off x="11282216" y="5832982"/>
+            <a:ext cx="720000" cy="720000"/>
+          </a:xfrm>
+          <a:prstGeom prst="ellipse">
+            <a:avLst/>
+          </a:prstGeom>
+          <a:solidFill>
+            <a:schemeClr val="bg1">
+              <a:lumMod val="75000"/>
+            </a:schemeClr>
+          </a:solidFill>
+          <a:ln>
+            <a:noFill/>
+          </a:ln>
+        </p:spPr>
+        <p:style>
+          <a:lnRef idx="2">
+            <a:schemeClr val="accent1">
+              <a:shade val="15000"/>
+            </a:schemeClr>
+          </a:lnRef>
+          <a:fillRef idx="1">
+            <a:schemeClr val="accent1"/>
+          </a:fillRef>
+          <a:effectRef idx="0">
+            <a:schemeClr val="accent1"/>
+          </a:effectRef>
+          <a:fontRef idx="minor">
+            <a:schemeClr val="lt1"/>
+          </a:fontRef>
+        </p:style>
+        <p:txBody>
+          <a:bodyPr rtlCol="0" anchor="ctr"/>
+          <a:lstStyle/>
+          <a:p>
+            <a:pPr algn="ctr"/>
+            <a:endParaRPr lang="pt-BR"/>
+          </a:p>
+        </p:txBody>
+      </p:sp>
+      <p:sp>
+        <p:nvSpPr>
+          <p:cNvPr id="17" name="Oval 16">
+            <a:extLst>
+              <a:ext uri="{FF2B5EF4-FFF2-40B4-BE49-F238E27FC236}">
+                <a16:creationId xmlns:a16="http://schemas.microsoft.com/office/drawing/2014/main" id="{864CFF2E-C543-3AEC-B18F-139444B62330}"/>
+              </a:ext>
+            </a:extLst>
+          </p:cNvPr>
+          <p:cNvSpPr/>
+          <p:nvPr/>
+        </p:nvSpPr>
+        <p:spPr>
+          <a:xfrm>
+            <a:off x="235966" y="5894392"/>
+            <a:ext cx="720000" cy="720000"/>
+          </a:xfrm>
+          <a:prstGeom prst="ellipse">
+            <a:avLst/>
+          </a:prstGeom>
+          <a:solidFill>
+            <a:schemeClr val="tx1"/>
+          </a:solidFill>
+          <a:ln>
+            <a:noFill/>
+          </a:ln>
+        </p:spPr>
+        <p:style>
+          <a:lnRef idx="2">
+            <a:schemeClr val="accent1">
+              <a:shade val="15000"/>
+            </a:schemeClr>
+          </a:lnRef>
+          <a:fillRef idx="1">
+            <a:schemeClr val="accent1"/>
+          </a:fillRef>
+          <a:effectRef idx="0">
+            <a:schemeClr val="accent1"/>
+          </a:effectRef>
+          <a:fontRef idx="minor">
+            <a:schemeClr val="lt1"/>
+          </a:fontRef>
+        </p:style>
+        <p:txBody>
+          <a:bodyPr rtlCol="0" anchor="ctr"/>
+          <a:lstStyle/>
+          <a:p>
+            <a:pPr algn="ctr"/>
+            <a:endParaRPr lang="pt-BR"/>
+          </a:p>
+        </p:txBody>
+      </p:sp>
       <p:pic>
         <p:nvPicPr>
-          <p:cNvPr id="31" name="Graphic 30" descr="School boy with solid fill">
-            <a:extLst>
-              <a:ext uri="{FF2B5EF4-FFF2-40B4-BE49-F238E27FC236}">
-                <a16:creationId xmlns:a16="http://schemas.microsoft.com/office/drawing/2014/main" id="{64DEEE1C-E68F-4207-C43F-0FBE05308A0A}"/>
+          <p:cNvPr id="19" name="Graphic 18" descr="Muscular arm with solid fill">
+            <a:extLst>
+              <a:ext uri="{FF2B5EF4-FFF2-40B4-BE49-F238E27FC236}">
+                <a16:creationId xmlns:a16="http://schemas.microsoft.com/office/drawing/2014/main" id="{4BAA1300-DDB1-E5B0-B5E5-0180FB51C3B4}"/>
               </a:ext>
             </a:extLst>
           </p:cNvPr>
@@ -2196,10 +2877,10 @@
           <p:nvPr/>
         </p:nvPicPr>
         <p:blipFill>
-          <a:blip r:embed="rId12">
+          <a:blip r:embed="rId2">
             <a:extLst>
               <a:ext uri="{96DAC541-7B7A-43D3-8B79-37D633B846F1}">
-                <asvg:svgBlip xmlns:asvg="http://schemas.microsoft.com/office/drawing/2016/SVG/main" r:embed="rId13"/>
+                <asvg:svgBlip xmlns:asvg="http://schemas.microsoft.com/office/drawing/2016/SVG/main" r:embed="rId3"/>
               </a:ext>
             </a:extLst>
           </a:blip>
@@ -2209,20 +2890,214 @@
         </p:blipFill>
         <p:spPr>
           <a:xfrm>
-            <a:off x="2873251" y="852241"/>
-            <a:ext cx="441450" cy="441450"/>
+            <a:off x="367366" y="379626"/>
+            <a:ext cx="457200" cy="457200"/>
           </a:xfrm>
           <a:prstGeom prst="rect">
             <a:avLst/>
           </a:prstGeom>
         </p:spPr>
       </p:pic>
+      <p:pic>
+        <p:nvPicPr>
+          <p:cNvPr id="21" name="Graphic 20" descr="Handshake with solid fill">
+            <a:extLst>
+              <a:ext uri="{FF2B5EF4-FFF2-40B4-BE49-F238E27FC236}">
+                <a16:creationId xmlns:a16="http://schemas.microsoft.com/office/drawing/2014/main" id="{09A4D7D7-0CF9-4A35-7652-17BBC4EE5659}"/>
+              </a:ext>
+            </a:extLst>
+          </p:cNvPr>
+          <p:cNvPicPr>
+            <a:picLocks noChangeAspect="1"/>
+          </p:cNvPicPr>
+          <p:nvPr/>
+        </p:nvPicPr>
+        <p:blipFill>
+          <a:blip r:embed="rId4">
+            <a:extLst>
+              <a:ext uri="{96DAC541-7B7A-43D3-8B79-37D633B846F1}">
+                <asvg:svgBlip xmlns:asvg="http://schemas.microsoft.com/office/drawing/2016/SVG/main" r:embed="rId5"/>
+              </a:ext>
+            </a:extLst>
+          </a:blip>
+          <a:stretch>
+            <a:fillRect/>
+          </a:stretch>
+        </p:blipFill>
+        <p:spPr>
+          <a:xfrm>
+            <a:off x="11472013" y="6031436"/>
+            <a:ext cx="360035" cy="360035"/>
+          </a:xfrm>
+          <a:prstGeom prst="rect">
+            <a:avLst/>
+          </a:prstGeom>
+        </p:spPr>
+      </p:pic>
+      <p:pic>
+        <p:nvPicPr>
+          <p:cNvPr id="23" name="Graphic 22" descr="Fire with solid fill">
+            <a:extLst>
+              <a:ext uri="{FF2B5EF4-FFF2-40B4-BE49-F238E27FC236}">
+                <a16:creationId xmlns:a16="http://schemas.microsoft.com/office/drawing/2014/main" id="{048F9A98-5E32-C5CF-5E70-6DC7B7C50D7B}"/>
+              </a:ext>
+            </a:extLst>
+          </p:cNvPr>
+          <p:cNvPicPr>
+            <a:picLocks noChangeAspect="1"/>
+          </p:cNvPicPr>
+          <p:nvPr/>
+        </p:nvPicPr>
+        <p:blipFill>
+          <a:blip r:embed="rId6">
+            <a:extLst>
+              <a:ext uri="{96DAC541-7B7A-43D3-8B79-37D633B846F1}">
+                <asvg:svgBlip xmlns:asvg="http://schemas.microsoft.com/office/drawing/2016/SVG/main" r:embed="rId7"/>
+              </a:ext>
+            </a:extLst>
+          </a:blip>
+          <a:stretch>
+            <a:fillRect/>
+          </a:stretch>
+        </p:blipFill>
+        <p:spPr>
+          <a:xfrm>
+            <a:off x="424606" y="6083032"/>
+            <a:ext cx="342720" cy="342720"/>
+          </a:xfrm>
+          <a:prstGeom prst="rect">
+            <a:avLst/>
+          </a:prstGeom>
+        </p:spPr>
+      </p:pic>
+      <p:pic>
+        <p:nvPicPr>
+          <p:cNvPr id="25" name="Graphic 24" descr="Empty battery with solid fill">
+            <a:extLst>
+              <a:ext uri="{FF2B5EF4-FFF2-40B4-BE49-F238E27FC236}">
+                <a16:creationId xmlns:a16="http://schemas.microsoft.com/office/drawing/2014/main" id="{BAE75AB4-12B6-DB22-5145-09A84883DE19}"/>
+              </a:ext>
+            </a:extLst>
+          </p:cNvPr>
+          <p:cNvPicPr>
+            <a:picLocks noChangeAspect="1"/>
+          </p:cNvPicPr>
+          <p:nvPr/>
+        </p:nvPicPr>
+        <p:blipFill>
+          <a:blip r:embed="rId8">
+            <a:extLst>
+              <a:ext uri="{96DAC541-7B7A-43D3-8B79-37D633B846F1}">
+                <asvg:svgBlip xmlns:asvg="http://schemas.microsoft.com/office/drawing/2016/SVG/main" r:embed="rId9"/>
+              </a:ext>
+            </a:extLst>
+          </a:blip>
+          <a:stretch>
+            <a:fillRect/>
+          </a:stretch>
+        </p:blipFill>
+        <p:spPr>
+          <a:xfrm>
+            <a:off x="11499051" y="462751"/>
+            <a:ext cx="315413" cy="315413"/>
+          </a:xfrm>
+          <a:prstGeom prst="rect">
+            <a:avLst/>
+          </a:prstGeom>
+        </p:spPr>
+      </p:pic>
+      <p:cxnSp>
+        <p:nvCxnSpPr>
+          <p:cNvPr id="27" name="Straight Connector 26">
+            <a:extLst>
+              <a:ext uri="{FF2B5EF4-FFF2-40B4-BE49-F238E27FC236}">
+                <a16:creationId xmlns:a16="http://schemas.microsoft.com/office/drawing/2014/main" id="{DDBAF66F-2631-1E5E-A230-FC48CC09B79D}"/>
+              </a:ext>
+            </a:extLst>
+          </p:cNvPr>
+          <p:cNvCxnSpPr/>
+          <p:nvPr/>
+        </p:nvCxnSpPr>
+        <p:spPr>
+          <a:xfrm>
+            <a:off x="0" y="3493652"/>
+            <a:ext cx="12192000" cy="0"/>
+          </a:xfrm>
+          <a:prstGeom prst="line">
+            <a:avLst/>
+          </a:prstGeom>
+          <a:ln w="9525">
+            <a:solidFill>
+              <a:srgbClr val="E2E2E2"/>
+            </a:solidFill>
+            <a:prstDash val="solid"/>
+          </a:ln>
+        </p:spPr>
+        <p:style>
+          <a:lnRef idx="2">
+            <a:schemeClr val="accent1"/>
+          </a:lnRef>
+          <a:fillRef idx="0">
+            <a:schemeClr val="accent1"/>
+          </a:fillRef>
+          <a:effectRef idx="1">
+            <a:schemeClr val="accent1"/>
+          </a:effectRef>
+          <a:fontRef idx="minor">
+            <a:schemeClr val="tx1"/>
+          </a:fontRef>
+        </p:style>
+      </p:cxnSp>
+      <p:cxnSp>
+        <p:nvCxnSpPr>
+          <p:cNvPr id="29" name="Straight Connector 28">
+            <a:extLst>
+              <a:ext uri="{FF2B5EF4-FFF2-40B4-BE49-F238E27FC236}">
+                <a16:creationId xmlns:a16="http://schemas.microsoft.com/office/drawing/2014/main" id="{168E5DCA-68A5-2A60-E5B7-9FFE822488E8}"/>
+              </a:ext>
+            </a:extLst>
+          </p:cNvPr>
+          <p:cNvCxnSpPr>
+            <a:cxnSpLocks/>
+          </p:cNvCxnSpPr>
+          <p:nvPr/>
+        </p:nvCxnSpPr>
+        <p:spPr>
+          <a:xfrm flipH="1" flipV="1">
+            <a:off x="5994400" y="64655"/>
+            <a:ext cx="0" cy="6793345"/>
+          </a:xfrm>
+          <a:prstGeom prst="line">
+            <a:avLst/>
+          </a:prstGeom>
+          <a:ln w="9525">
+            <a:solidFill>
+              <a:srgbClr val="E2E2E2"/>
+            </a:solidFill>
+            <a:prstDash val="solid"/>
+          </a:ln>
+        </p:spPr>
+        <p:style>
+          <a:lnRef idx="2">
+            <a:schemeClr val="accent1"/>
+          </a:lnRef>
+          <a:fillRef idx="0">
+            <a:schemeClr val="accent1"/>
+          </a:fillRef>
+          <a:effectRef idx="1">
+            <a:schemeClr val="accent1"/>
+          </a:effectRef>
+          <a:fontRef idx="minor">
+            <a:schemeClr val="tx1"/>
+          </a:fontRef>
+        </p:style>
+      </p:cxnSp>
       <p:sp>
         <p:nvSpPr>
           <p:cNvPr id="32" name="TextBox 31">
             <a:extLst>
               <a:ext uri="{FF2B5EF4-FFF2-40B4-BE49-F238E27FC236}">
-                <a16:creationId xmlns:a16="http://schemas.microsoft.com/office/drawing/2014/main" id="{1DBABAF1-8ED0-88B4-8CB7-E6036BABB6AA}"/>
+                <a16:creationId xmlns:a16="http://schemas.microsoft.com/office/drawing/2014/main" id="{3C120B74-3D9F-00EC-D4B7-93E91AE92102}"/>
               </a:ext>
             </a:extLst>
           </p:cNvPr>
@@ -2231,8 +3106,8 @@
         </p:nvSpPr>
         <p:spPr>
           <a:xfrm>
-            <a:off x="3413251" y="926921"/>
-            <a:ext cx="1848583" cy="307777"/>
+            <a:off x="1070470" y="498272"/>
+            <a:ext cx="1346844" cy="338554"/>
           </a:xfrm>
           <a:prstGeom prst="rect">
             <a:avLst/>
@@ -2246,30 +3121,255 @@
           <a:lstStyle/>
           <a:p>
             <a:r>
-              <a:rPr lang="pt-BR" sz="1400" b="1" dirty="0">
+              <a:rPr lang="pt-BR" sz="1600" dirty="0">
                 <a:latin typeface="Roboto" panose="02000000000000000000" pitchFamily="2" charset="0"/>
                 <a:ea typeface="Roboto" panose="02000000000000000000" pitchFamily="2" charset="0"/>
               </a:rPr>
-              <a:t>Welcome back, </a:t>
-            </a:r>
-            <a:r>
-              <a:rPr lang="pt-BR" sz="1400" dirty="0">
+              <a:t>STRENGHTS</a:t>
+            </a:r>
+          </a:p>
+        </p:txBody>
+      </p:sp>
+      <p:sp>
+        <p:nvSpPr>
+          <p:cNvPr id="33" name="TextBox 32">
+            <a:extLst>
+              <a:ext uri="{FF2B5EF4-FFF2-40B4-BE49-F238E27FC236}">
+                <a16:creationId xmlns:a16="http://schemas.microsoft.com/office/drawing/2014/main" id="{56210124-9A4C-E8EA-3CEE-3436035E0E0D}"/>
+              </a:ext>
+            </a:extLst>
+          </p:cNvPr>
+          <p:cNvSpPr txBox="1"/>
+          <p:nvPr/>
+        </p:nvSpPr>
+        <p:spPr>
+          <a:xfrm>
+            <a:off x="9671669" y="485353"/>
+            <a:ext cx="1491114" cy="338554"/>
+          </a:xfrm>
+          <a:prstGeom prst="rect">
+            <a:avLst/>
+          </a:prstGeom>
+          <a:noFill/>
+        </p:spPr>
+        <p:txBody>
+          <a:bodyPr wrap="none" rtlCol="0">
+            <a:spAutoFit/>
+          </a:bodyPr>
+          <a:lstStyle/>
+          <a:p>
+            <a:r>
+              <a:rPr lang="pt-BR" sz="1600" dirty="0">
                 <a:latin typeface="Roboto" panose="02000000000000000000" pitchFamily="2" charset="0"/>
                 <a:ea typeface="Roboto" panose="02000000000000000000" pitchFamily="2" charset="0"/>
               </a:rPr>
-              <a:t>user</a:t>
-            </a:r>
-            <a:r>
-              <a:rPr lang="pt-BR" sz="1400" b="1" dirty="0">
+              <a:t>WEAKNESSES</a:t>
+            </a:r>
+          </a:p>
+        </p:txBody>
+      </p:sp>
+      <p:sp>
+        <p:nvSpPr>
+          <p:cNvPr id="34" name="TextBox 33">
+            <a:extLst>
+              <a:ext uri="{FF2B5EF4-FFF2-40B4-BE49-F238E27FC236}">
+                <a16:creationId xmlns:a16="http://schemas.microsoft.com/office/drawing/2014/main" id="{CFEE02D5-0E59-4750-3F40-0D137B68B42D}"/>
+              </a:ext>
+            </a:extLst>
+          </p:cNvPr>
+          <p:cNvSpPr txBox="1"/>
+          <p:nvPr/>
+        </p:nvSpPr>
+        <p:spPr>
+          <a:xfrm>
+            <a:off x="9497168" y="6080275"/>
+            <a:ext cx="1726755" cy="338554"/>
+          </a:xfrm>
+          <a:prstGeom prst="rect">
+            <a:avLst/>
+          </a:prstGeom>
+          <a:noFill/>
+        </p:spPr>
+        <p:txBody>
+          <a:bodyPr wrap="none" rtlCol="0">
+            <a:spAutoFit/>
+          </a:bodyPr>
+          <a:lstStyle/>
+          <a:p>
+            <a:r>
+              <a:rPr lang="pt-BR" sz="1600" dirty="0">
                 <a:latin typeface="Roboto" panose="02000000000000000000" pitchFamily="2" charset="0"/>
                 <a:ea typeface="Roboto" panose="02000000000000000000" pitchFamily="2" charset="0"/>
               </a:rPr>
-              <a:t>!</a:t>
-            </a:r>
-            <a:endParaRPr lang="pt-BR" sz="1200" b="1" dirty="0">
+              <a:t>OPPORTUNITIES</a:t>
+            </a:r>
+          </a:p>
+        </p:txBody>
+      </p:sp>
+      <p:sp>
+        <p:nvSpPr>
+          <p:cNvPr id="35" name="TextBox 34">
+            <a:extLst>
+              <a:ext uri="{FF2B5EF4-FFF2-40B4-BE49-F238E27FC236}">
+                <a16:creationId xmlns:a16="http://schemas.microsoft.com/office/drawing/2014/main" id="{233E4487-CFB7-A644-20EC-EF67F05C10E9}"/>
+              </a:ext>
+            </a:extLst>
+          </p:cNvPr>
+          <p:cNvSpPr txBox="1"/>
+          <p:nvPr/>
+        </p:nvSpPr>
+        <p:spPr>
+          <a:xfrm>
+            <a:off x="1050864" y="6087432"/>
+            <a:ext cx="1072730" cy="338554"/>
+          </a:xfrm>
+          <a:prstGeom prst="rect">
+            <a:avLst/>
+          </a:prstGeom>
+          <a:noFill/>
+        </p:spPr>
+        <p:txBody>
+          <a:bodyPr wrap="none" rtlCol="0">
+            <a:spAutoFit/>
+          </a:bodyPr>
+          <a:lstStyle/>
+          <a:p>
+            <a:r>
+              <a:rPr lang="pt-BR" sz="1600" dirty="0">
+                <a:latin typeface="Roboto" panose="02000000000000000000" pitchFamily="2" charset="0"/>
+                <a:ea typeface="Roboto" panose="02000000000000000000" pitchFamily="2" charset="0"/>
+              </a:rPr>
+              <a:t>THREATS</a:t>
+            </a:r>
+          </a:p>
+        </p:txBody>
+      </p:sp>
+      <p:sp>
+        <p:nvSpPr>
+          <p:cNvPr id="2" name="TextBox 1">
+            <a:extLst>
+              <a:ext uri="{FF2B5EF4-FFF2-40B4-BE49-F238E27FC236}">
+                <a16:creationId xmlns:a16="http://schemas.microsoft.com/office/drawing/2014/main" id="{8EBBA98D-D53B-2015-3461-9A791BB2ACA1}"/>
+              </a:ext>
+            </a:extLst>
+          </p:cNvPr>
+          <p:cNvSpPr txBox="1"/>
+          <p:nvPr/>
+        </p:nvSpPr>
+        <p:spPr>
+          <a:xfrm>
+            <a:off x="284629" y="1119773"/>
+            <a:ext cx="3954112" cy="830997"/>
+          </a:xfrm>
+          <a:prstGeom prst="rect">
+            <a:avLst/>
+          </a:prstGeom>
+          <a:noFill/>
+        </p:spPr>
+        <p:txBody>
+          <a:bodyPr wrap="square" rtlCol="0">
+            <a:spAutoFit/>
+          </a:bodyPr>
+          <a:lstStyle/>
+          <a:p>
+            <a:pPr marL="171450" indent="-171450">
+              <a:buFont typeface="Arial" panose="020B0604020202020204" pitchFamily="34" charset="0"/>
+              <a:buChar char="•"/>
+            </a:pPr>
+            <a:r>
+              <a:rPr lang="pt-BR" sz="1200" dirty="0">
+                <a:latin typeface="Roboto" panose="02000000000000000000" pitchFamily="2" charset="0"/>
+                <a:ea typeface="Roboto" panose="02000000000000000000" pitchFamily="2" charset="0"/>
+              </a:rPr>
+              <a:t>Clear visual structure</a:t>
+            </a:r>
+          </a:p>
+          <a:p>
+            <a:pPr marL="171450" indent="-171450">
+              <a:buFont typeface="Arial" panose="020B0604020202020204" pitchFamily="34" charset="0"/>
+              <a:buChar char="•"/>
+            </a:pPr>
+            <a:r>
+              <a:rPr lang="pt-BR" sz="1200" dirty="0">
+                <a:latin typeface="Roboto" panose="02000000000000000000" pitchFamily="2" charset="0"/>
+                <a:ea typeface="Roboto" panose="02000000000000000000" pitchFamily="2" charset="0"/>
+              </a:rPr>
+              <a:t>Easy interaction infraestructure and good readability</a:t>
+            </a:r>
+          </a:p>
+          <a:p>
+            <a:pPr marL="171450" indent="-171450">
+              <a:buFont typeface="Arial" panose="020B0604020202020204" pitchFamily="34" charset="0"/>
+              <a:buChar char="•"/>
+            </a:pPr>
+            <a:r>
+              <a:rPr lang="pt-BR" sz="1200" dirty="0">
+                <a:latin typeface="Roboto" panose="02000000000000000000" pitchFamily="2" charset="0"/>
+                <a:ea typeface="Roboto" panose="02000000000000000000" pitchFamily="2" charset="0"/>
+              </a:rPr>
+              <a:t>Good styling </a:t>
+            </a:r>
+          </a:p>
+          <a:p>
+            <a:endParaRPr lang="pt-BR" sz="1200" dirty="0">
               <a:latin typeface="Roboto" panose="02000000000000000000" pitchFamily="2" charset="0"/>
               <a:ea typeface="Roboto" panose="02000000000000000000" pitchFamily="2" charset="0"/>
             </a:endParaRPr>
+          </a:p>
+        </p:txBody>
+      </p:sp>
+      <p:sp>
+        <p:nvSpPr>
+          <p:cNvPr id="3" name="TextBox 2">
+            <a:extLst>
+              <a:ext uri="{FF2B5EF4-FFF2-40B4-BE49-F238E27FC236}">
+                <a16:creationId xmlns:a16="http://schemas.microsoft.com/office/drawing/2014/main" id="{F8ADCD5B-63E9-4EAB-72A0-F52488042FDC}"/>
+              </a:ext>
+            </a:extLst>
+          </p:cNvPr>
+          <p:cNvSpPr txBox="1"/>
+          <p:nvPr/>
+        </p:nvSpPr>
+        <p:spPr>
+          <a:xfrm>
+            <a:off x="8383489" y="1119773"/>
+            <a:ext cx="3716147" cy="646331"/>
+          </a:xfrm>
+          <a:prstGeom prst="rect">
+            <a:avLst/>
+          </a:prstGeom>
+          <a:noFill/>
+        </p:spPr>
+        <p:txBody>
+          <a:bodyPr wrap="square" rtlCol="0">
+            <a:spAutoFit/>
+          </a:bodyPr>
+          <a:lstStyle/>
+          <a:p>
+            <a:pPr marL="171450" indent="-171450">
+              <a:buFont typeface="Arial" panose="020B0604020202020204" pitchFamily="34" charset="0"/>
+              <a:buChar char="•"/>
+            </a:pPr>
+            <a:r>
+              <a:rPr lang="pt-BR" sz="1200" dirty="0">
+                <a:latin typeface="Roboto" panose="02000000000000000000" pitchFamily="2" charset="0"/>
+                <a:ea typeface="Roboto" panose="02000000000000000000" pitchFamily="2" charset="0"/>
+              </a:rPr>
+              <a:t>Static layout and limited responses (hard coded margins using x and y offset</a:t>
+            </a:r>
+          </a:p>
+          <a:p>
+            <a:pPr marL="171450" indent="-171450">
+              <a:buFont typeface="Arial" panose="020B0604020202020204" pitchFamily="34" charset="0"/>
+              <a:buChar char="•"/>
+            </a:pPr>
+            <a:r>
+              <a:rPr lang="pt-BR" sz="1200" dirty="0">
+                <a:latin typeface="Roboto" panose="02000000000000000000" pitchFamily="2" charset="0"/>
+                <a:ea typeface="Roboto" panose="02000000000000000000" pitchFamily="2" charset="0"/>
+              </a:rPr>
+              <a:t>Binary gender limitation</a:t>
+            </a:r>
           </a:p>
         </p:txBody>
       </p:sp>
@@ -2278,7 +3378,7 @@
           <p:cNvPr id="4" name="TextBox 3">
             <a:extLst>
               <a:ext uri="{FF2B5EF4-FFF2-40B4-BE49-F238E27FC236}">
-                <a16:creationId xmlns:a16="http://schemas.microsoft.com/office/drawing/2014/main" id="{31067833-CF12-ABC0-A69B-89C5C2869510}"/>
+                <a16:creationId xmlns:a16="http://schemas.microsoft.com/office/drawing/2014/main" id="{52249EA3-8FDF-F740-AC03-0780BB7010CB}"/>
               </a:ext>
             </a:extLst>
           </p:cNvPr>
@@ -2286,9 +3386,9 @@
           <p:nvPr/>
         </p:nvSpPr>
         <p:spPr>
-          <a:xfrm rot="19731122">
-            <a:off x="4163410" y="2889128"/>
-            <a:ext cx="5957455" cy="2123658"/>
+          <a:xfrm>
+            <a:off x="284629" y="3741350"/>
+            <a:ext cx="3954112" cy="830997"/>
           </a:xfrm>
           <a:prstGeom prst="rect">
             <a:avLst/>
@@ -2301,13 +3401,110 @@
           </a:bodyPr>
           <a:lstStyle/>
           <a:p>
-            <a:pPr algn="ctr"/>
-            <a:r>
-              <a:rPr lang="pt-BR" sz="6600" i="1" dirty="0">
+            <a:pPr marL="171450" indent="-171450">
+              <a:buFont typeface="Arial" panose="020B0604020202020204" pitchFamily="34" charset="0"/>
+              <a:buChar char="•"/>
+            </a:pPr>
+            <a:r>
+              <a:rPr lang="pt-BR" sz="1200" dirty="0">
                 <a:latin typeface="Roboto" panose="02000000000000000000" pitchFamily="2" charset="0"/>
                 <a:ea typeface="Roboto" panose="02000000000000000000" pitchFamily="2" charset="0"/>
               </a:rPr>
-              <a:t>CHARTS TO BE ADDED HERE!</a:t>
+              <a:t>Limited scalability</a:t>
+            </a:r>
+          </a:p>
+          <a:p>
+            <a:pPr marL="171450" indent="-171450">
+              <a:buFont typeface="Arial" panose="020B0604020202020204" pitchFamily="34" charset="0"/>
+              <a:buChar char="•"/>
+            </a:pPr>
+            <a:r>
+              <a:rPr lang="pt-BR" sz="1200" dirty="0">
+                <a:latin typeface="Roboto" panose="02000000000000000000" pitchFamily="2" charset="0"/>
+                <a:ea typeface="Roboto" panose="02000000000000000000" pitchFamily="2" charset="0"/>
+              </a:rPr>
+              <a:t>Exclusion risks due gender</a:t>
+            </a:r>
+          </a:p>
+          <a:p>
+            <a:pPr marL="171450" indent="-171450">
+              <a:buFont typeface="Arial" panose="020B0604020202020204" pitchFamily="34" charset="0"/>
+              <a:buChar char="•"/>
+            </a:pPr>
+            <a:r>
+              <a:rPr lang="pt-BR" sz="1200" dirty="0">
+                <a:latin typeface="Roboto" panose="02000000000000000000" pitchFamily="2" charset="0"/>
+                <a:ea typeface="Roboto" panose="02000000000000000000" pitchFamily="2" charset="0"/>
+              </a:rPr>
+              <a:t>Framework limitation since using p5.js (face constraints in enterprise level web applications)</a:t>
+            </a:r>
+          </a:p>
+        </p:txBody>
+      </p:sp>
+      <p:sp>
+        <p:nvSpPr>
+          <p:cNvPr id="9" name="TextBox 8">
+            <a:extLst>
+              <a:ext uri="{FF2B5EF4-FFF2-40B4-BE49-F238E27FC236}">
+                <a16:creationId xmlns:a16="http://schemas.microsoft.com/office/drawing/2014/main" id="{3BDE4C7F-85B6-1527-9EA5-49C46E36A19C}"/>
+              </a:ext>
+            </a:extLst>
+          </p:cNvPr>
+          <p:cNvSpPr txBox="1"/>
+          <p:nvPr/>
+        </p:nvSpPr>
+        <p:spPr>
+          <a:xfrm>
+            <a:off x="8440170" y="3707243"/>
+            <a:ext cx="3659466" cy="830997"/>
+          </a:xfrm>
+          <a:prstGeom prst="rect">
+            <a:avLst/>
+          </a:prstGeom>
+          <a:noFill/>
+        </p:spPr>
+        <p:txBody>
+          <a:bodyPr wrap="square" rtlCol="0">
+            <a:spAutoFit/>
+          </a:bodyPr>
+          <a:lstStyle/>
+          <a:p>
+            <a:pPr marL="171450" indent="-171450">
+              <a:buFont typeface="Arial" panose="020B0604020202020204" pitchFamily="34" charset="0"/>
+              <a:buChar char="•"/>
+            </a:pPr>
+            <a:r>
+              <a:rPr lang="pt-BR" sz="1200" dirty="0">
+                <a:latin typeface="Roboto" panose="02000000000000000000" pitchFamily="2" charset="0"/>
+                <a:ea typeface="Roboto" panose="02000000000000000000" pitchFamily="2" charset="0"/>
+              </a:rPr>
+              <a:t>Implement hover based legends and tooltips</a:t>
+            </a:r>
+          </a:p>
+          <a:p>
+            <a:pPr marL="171450" indent="-171450">
+              <a:buFont typeface="Arial" panose="020B0604020202020204" pitchFamily="34" charset="0"/>
+              <a:buChar char="•"/>
+            </a:pPr>
+            <a:r>
+              <a:rPr lang="pt-BR" sz="1200" dirty="0">
+                <a:latin typeface="Roboto" panose="02000000000000000000" pitchFamily="2" charset="0"/>
+                <a:ea typeface="Roboto" panose="02000000000000000000" pitchFamily="2" charset="0"/>
+              </a:rPr>
+              <a:t>Personalize color palette</a:t>
+            </a:r>
+          </a:p>
+          <a:p>
+            <a:pPr marL="171450" indent="-171450">
+              <a:buFont typeface="Arial" panose="020B0604020202020204" pitchFamily="34" charset="0"/>
+              <a:buChar char="•"/>
+            </a:pPr>
+            <a:r>
+              <a:rPr lang="pt-BR" sz="1200" dirty="0">
+                <a:latin typeface="Roboto" panose="02000000000000000000" pitchFamily="2" charset="0"/>
+                <a:ea typeface="Roboto" panose="02000000000000000000" pitchFamily="2" charset="0"/>
+              </a:rPr>
+              <a:t>Customize stacked columns to improve visualization</a:t>
             </a:r>
           </a:p>
         </p:txBody>
@@ -2315,7 +3512,7 @@
     </p:spTree>
     <p:extLst>
       <p:ext uri="{BB962C8B-B14F-4D97-AF65-F5344CB8AC3E}">
-        <p14:creationId xmlns:p14="http://schemas.microsoft.com/office/powerpoint/2010/main" val="4227888350"/>
+        <p14:creationId xmlns:p14="http://schemas.microsoft.com/office/powerpoint/2010/main" val="2278949207"/>
       </p:ext>
     </p:extLst>
   </p:cSld>
@@ -2325,7 +3522,7 @@
 </p:sld>
 </file>
 
-<file path=ppt/slides/slide10.xml><?xml version="1.0" encoding="utf-8"?>
+<file path=ppt/slides/slide11.xml><?xml version="1.0" encoding="utf-8"?>
 <p:sld xmlns:a="http://schemas.openxmlformats.org/drawingml/2006/main" xmlns:r="http://schemas.openxmlformats.org/officeDocument/2006/relationships" xmlns:p="http://schemas.openxmlformats.org/presentationml/2006/main">
   <p:cSld>
     <p:spTree>
@@ -3705,7 +4902,7 @@
 </p:sld>
 </file>
 
-<file path=ppt/slides/slide11.xml><?xml version="1.0" encoding="utf-8"?>
+<file path=ppt/slides/slide12.xml><?xml version="1.0" encoding="utf-8"?>
 <p:sld xmlns:a="http://schemas.openxmlformats.org/drawingml/2006/main" xmlns:r="http://schemas.openxmlformats.org/officeDocument/2006/relationships" xmlns:p="http://schemas.openxmlformats.org/presentationml/2006/main">
   <p:cSld>
     <p:spTree>
@@ -4960,7 +6157,7 @@
 </p:sld>
 </file>
 
-<file path=ppt/slides/slide12.xml><?xml version="1.0" encoding="utf-8"?>
+<file path=ppt/slides/slide13.xml><?xml version="1.0" encoding="utf-8"?>
 <p:sld xmlns:a="http://schemas.openxmlformats.org/drawingml/2006/main" xmlns:r="http://schemas.openxmlformats.org/officeDocument/2006/relationships" xmlns:p="http://schemas.openxmlformats.org/presentationml/2006/main">
   <p:cSld>
     <p:spTree>
@@ -6350,7 +7547,7 @@
 </p:sld>
 </file>
 
-<file path=ppt/slides/slide13.xml><?xml version="1.0" encoding="utf-8"?>
+<file path=ppt/slides/slide14.xml><?xml version="1.0" encoding="utf-8"?>
 <p:sld xmlns:a="http://schemas.openxmlformats.org/drawingml/2006/main" xmlns:r="http://schemas.openxmlformats.org/officeDocument/2006/relationships" xmlns:p="http://schemas.openxmlformats.org/presentationml/2006/main">
   <p:cSld>
     <p:spTree>
@@ -7566,7 +8763,7 @@
 </p:sld>
 </file>
 
-<file path=ppt/slides/slide14.xml><?xml version="1.0" encoding="utf-8"?>
+<file path=ppt/slides/slide15.xml><?xml version="1.0" encoding="utf-8"?>
 <p:sld xmlns:a="http://schemas.openxmlformats.org/drawingml/2006/main" xmlns:r="http://schemas.openxmlformats.org/officeDocument/2006/relationships" xmlns:p="http://schemas.openxmlformats.org/presentationml/2006/main">
   <p:cSld>
     <p:spTree>
@@ -7632,7 +8829,7 @@
 </p:sld>
 </file>
 
-<file path=ppt/slides/slide15.xml><?xml version="1.0" encoding="utf-8"?>
+<file path=ppt/slides/slide16.xml><?xml version="1.0" encoding="utf-8"?>
 <p:sld xmlns:a="http://schemas.openxmlformats.org/drawingml/2006/main" xmlns:r="http://schemas.openxmlformats.org/officeDocument/2006/relationships" xmlns:p="http://schemas.openxmlformats.org/presentationml/2006/main">
   <p:cSld>
     <p:spTree>
@@ -7698,7 +8895,7 @@
 </p:sld>
 </file>
 
-<file path=ppt/slides/slide16.xml><?xml version="1.0" encoding="utf-8"?>
+<file path=ppt/slides/slide17.xml><?xml version="1.0" encoding="utf-8"?>
 <p:sld xmlns:a="http://schemas.openxmlformats.org/drawingml/2006/main" xmlns:r="http://schemas.openxmlformats.org/officeDocument/2006/relationships" xmlns:p="http://schemas.openxmlformats.org/presentationml/2006/main">
   <p:cSld>
     <p:spTree>
@@ -7764,7 +8961,7 @@
 </p:sld>
 </file>
 
-<file path=ppt/slides/slide17.xml><?xml version="1.0" encoding="utf-8"?>
+<file path=ppt/slides/slide18.xml><?xml version="1.0" encoding="utf-8"?>
 <p:sld xmlns:a="http://schemas.openxmlformats.org/drawingml/2006/main" xmlns:r="http://schemas.openxmlformats.org/officeDocument/2006/relationships" xmlns:p="http://schemas.openxmlformats.org/presentationml/2006/main">
   <p:cSld>
     <p:spTree>
@@ -7800,7 +8997,7 @@
 </p:sld>
 </file>
 
-<file path=ppt/slides/slide18.xml><?xml version="1.0" encoding="utf-8"?>
+<file path=ppt/slides/slide19.xml><?xml version="1.0" encoding="utf-8"?>
 <p:sld xmlns:a="http://schemas.openxmlformats.org/drawingml/2006/main" xmlns:r="http://schemas.openxmlformats.org/officeDocument/2006/relationships" xmlns:p="http://schemas.openxmlformats.org/presentationml/2006/main">
   <p:cSld>
     <p:spTree>
@@ -7836,7 +9033,897 @@
 </p:sld>
 </file>
 
-<file path=ppt/slides/slide19.xml><?xml version="1.0" encoding="utf-8"?>
+<file path=ppt/slides/slide2.xml><?xml version="1.0" encoding="utf-8"?>
+<p:sld xmlns:a="http://schemas.openxmlformats.org/drawingml/2006/main" xmlns:r="http://schemas.openxmlformats.org/officeDocument/2006/relationships" xmlns:p="http://schemas.openxmlformats.org/presentationml/2006/main">
+  <p:cSld>
+    <p:spTree>
+      <p:nvGrpSpPr>
+        <p:cNvPr id="1" name="">
+          <a:extLst>
+            <a:ext uri="{FF2B5EF4-FFF2-40B4-BE49-F238E27FC236}">
+              <a16:creationId xmlns:a16="http://schemas.microsoft.com/office/drawing/2014/main" id="{77DEBBF2-8888-EAEE-A3B0-E1B7B0ECA8BA}"/>
+            </a:ext>
+          </a:extLst>
+        </p:cNvPr>
+        <p:cNvGrpSpPr/>
+        <p:nvPr/>
+      </p:nvGrpSpPr>
+      <p:grpSpPr>
+        <a:xfrm>
+          <a:off x="0" y="0"/>
+          <a:ext cx="0" cy="0"/>
+          <a:chOff x="0" y="0"/>
+          <a:chExt cx="0" cy="0"/>
+        </a:xfrm>
+      </p:grpSpPr>
+      <p:sp>
+        <p:nvSpPr>
+          <p:cNvPr id="27" name="Rectangle 26">
+            <a:extLst>
+              <a:ext uri="{FF2B5EF4-FFF2-40B4-BE49-F238E27FC236}">
+                <a16:creationId xmlns:a16="http://schemas.microsoft.com/office/drawing/2014/main" id="{CFA06CCD-6716-D8DF-D16C-446CAEA6EA08}"/>
+              </a:ext>
+            </a:extLst>
+          </p:cNvPr>
+          <p:cNvSpPr/>
+          <p:nvPr/>
+        </p:nvSpPr>
+        <p:spPr>
+          <a:xfrm>
+            <a:off x="2686125" y="1501460"/>
+            <a:ext cx="8912027" cy="4987269"/>
+          </a:xfrm>
+          <a:prstGeom prst="rect">
+            <a:avLst/>
+          </a:prstGeom>
+          <a:solidFill>
+            <a:schemeClr val="bg1"/>
+          </a:solidFill>
+          <a:ln>
+            <a:noFill/>
+          </a:ln>
+          <a:effectLst>
+            <a:softEdge rad="0"/>
+          </a:effectLst>
+        </p:spPr>
+        <p:style>
+          <a:lnRef idx="2">
+            <a:schemeClr val="accent1">
+              <a:shade val="15000"/>
+            </a:schemeClr>
+          </a:lnRef>
+          <a:fillRef idx="1">
+            <a:schemeClr val="accent1"/>
+          </a:fillRef>
+          <a:effectRef idx="0">
+            <a:schemeClr val="accent1"/>
+          </a:effectRef>
+          <a:fontRef idx="minor">
+            <a:schemeClr val="lt1"/>
+          </a:fontRef>
+        </p:style>
+        <p:txBody>
+          <a:bodyPr rtlCol="0" anchor="ctr"/>
+          <a:lstStyle/>
+          <a:p>
+            <a:pPr algn="ctr"/>
+            <a:endParaRPr lang="pt-BR" dirty="0"/>
+          </a:p>
+        </p:txBody>
+      </p:sp>
+      <p:sp>
+        <p:nvSpPr>
+          <p:cNvPr id="22" name="Rectangle 21">
+            <a:extLst>
+              <a:ext uri="{FF2B5EF4-FFF2-40B4-BE49-F238E27FC236}">
+                <a16:creationId xmlns:a16="http://schemas.microsoft.com/office/drawing/2014/main" id="{F3E4B723-D5DA-CDB2-94AD-F6BADC544C0B}"/>
+              </a:ext>
+            </a:extLst>
+          </p:cNvPr>
+          <p:cNvSpPr/>
+          <p:nvPr/>
+        </p:nvSpPr>
+        <p:spPr>
+          <a:xfrm>
+            <a:off x="0" y="2407774"/>
+            <a:ext cx="2167254" cy="496937"/>
+          </a:xfrm>
+          <a:prstGeom prst="rect">
+            <a:avLst/>
+          </a:prstGeom>
+          <a:solidFill>
+            <a:schemeClr val="bg1">
+              <a:lumMod val="95000"/>
+            </a:schemeClr>
+          </a:solidFill>
+          <a:ln>
+            <a:noFill/>
+          </a:ln>
+        </p:spPr>
+        <p:style>
+          <a:lnRef idx="2">
+            <a:schemeClr val="accent1">
+              <a:shade val="15000"/>
+            </a:schemeClr>
+          </a:lnRef>
+          <a:fillRef idx="1">
+            <a:schemeClr val="accent1"/>
+          </a:fillRef>
+          <a:effectRef idx="0">
+            <a:schemeClr val="accent1"/>
+          </a:effectRef>
+          <a:fontRef idx="minor">
+            <a:schemeClr val="lt1"/>
+          </a:fontRef>
+        </p:style>
+        <p:txBody>
+          <a:bodyPr rtlCol="0" anchor="ctr"/>
+          <a:lstStyle/>
+          <a:p>
+            <a:pPr algn="ctr"/>
+            <a:endParaRPr lang="pt-BR" dirty="0"/>
+          </a:p>
+        </p:txBody>
+      </p:sp>
+      <p:grpSp>
+        <p:nvGrpSpPr>
+          <p:cNvPr id="20" name="Group 19">
+            <a:extLst>
+              <a:ext uri="{FF2B5EF4-FFF2-40B4-BE49-F238E27FC236}">
+                <a16:creationId xmlns:a16="http://schemas.microsoft.com/office/drawing/2014/main" id="{C8C5FC52-ABAD-C8FA-B3DA-F1DA8B9A09B2}"/>
+              </a:ext>
+            </a:extLst>
+          </p:cNvPr>
+          <p:cNvGrpSpPr/>
+          <p:nvPr/>
+        </p:nvGrpSpPr>
+        <p:grpSpPr>
+          <a:xfrm>
+            <a:off x="69619" y="1902799"/>
+            <a:ext cx="1976924" cy="304597"/>
+            <a:chOff x="125035" y="1902799"/>
+            <a:chExt cx="1976924" cy="304597"/>
+          </a:xfrm>
+        </p:grpSpPr>
+        <p:pic>
+          <p:nvPicPr>
+            <p:cNvPr id="2" name="Graphic 1" descr="Internet with solid fill">
+              <a:extLst>
+                <a:ext uri="{FF2B5EF4-FFF2-40B4-BE49-F238E27FC236}">
+                  <a16:creationId xmlns:a16="http://schemas.microsoft.com/office/drawing/2014/main" id="{DC3CEC4F-33A2-9A53-23C7-7D005F671970}"/>
+                </a:ext>
+              </a:extLst>
+            </p:cNvPr>
+            <p:cNvPicPr>
+              <a:picLocks noChangeAspect="1"/>
+            </p:cNvPicPr>
+            <p:nvPr/>
+          </p:nvPicPr>
+          <p:blipFill>
+            <a:blip r:embed="rId2">
+              <a:extLst>
+                <a:ext uri="{96DAC541-7B7A-43D3-8B79-37D633B846F1}">
+                  <asvg:svgBlip xmlns:asvg="http://schemas.microsoft.com/office/drawing/2016/SVG/main" r:embed="rId3"/>
+                </a:ext>
+              </a:extLst>
+            </a:blip>
+            <a:stretch>
+              <a:fillRect/>
+            </a:stretch>
+          </p:blipFill>
+          <p:spPr>
+            <a:xfrm>
+              <a:off x="125035" y="1902799"/>
+              <a:ext cx="304597" cy="304597"/>
+            </a:xfrm>
+            <a:prstGeom prst="rect">
+              <a:avLst/>
+            </a:prstGeom>
+          </p:spPr>
+        </p:pic>
+        <p:sp>
+          <p:nvSpPr>
+            <p:cNvPr id="3" name="TextBox 2">
+              <a:extLst>
+                <a:ext uri="{FF2B5EF4-FFF2-40B4-BE49-F238E27FC236}">
+                  <a16:creationId xmlns:a16="http://schemas.microsoft.com/office/drawing/2014/main" id="{E2004FB4-FA8C-43BE-D441-49A1926217A1}"/>
+                </a:ext>
+              </a:extLst>
+            </p:cNvPr>
+            <p:cNvSpPr txBox="1"/>
+            <p:nvPr/>
+          </p:nvSpPr>
+          <p:spPr>
+            <a:xfrm>
+              <a:off x="487414" y="1922434"/>
+              <a:ext cx="1614545" cy="276999"/>
+            </a:xfrm>
+            <a:prstGeom prst="rect">
+              <a:avLst/>
+            </a:prstGeom>
+            <a:noFill/>
+          </p:spPr>
+          <p:txBody>
+            <a:bodyPr wrap="none" rtlCol="0">
+              <a:spAutoFit/>
+            </a:bodyPr>
+            <a:lstStyle/>
+            <a:p>
+              <a:r>
+                <a:rPr lang="pt-BR" sz="1200" b="1" dirty="0">
+                  <a:solidFill>
+                    <a:srgbClr val="E2E2E2"/>
+                  </a:solidFill>
+                  <a:latin typeface="Source Sans Pro" panose="020B0503030403020204" pitchFamily="34" charset="0"/>
+                  <a:ea typeface="Source Sans Pro" panose="020B0503030403020204" pitchFamily="34" charset="0"/>
+                </a:rPr>
+                <a:t>Tech Diversity: Race</a:t>
+              </a:r>
+            </a:p>
+          </p:txBody>
+        </p:sp>
+      </p:grpSp>
+      <p:grpSp>
+        <p:nvGrpSpPr>
+          <p:cNvPr id="19" name="Group 18">
+            <a:extLst>
+              <a:ext uri="{FF2B5EF4-FFF2-40B4-BE49-F238E27FC236}">
+                <a16:creationId xmlns:a16="http://schemas.microsoft.com/office/drawing/2014/main" id="{AC215D5B-41DE-B044-D2A9-86EC044ED006}"/>
+              </a:ext>
+            </a:extLst>
+          </p:cNvPr>
+          <p:cNvGrpSpPr/>
+          <p:nvPr/>
+        </p:nvGrpSpPr>
+        <p:grpSpPr>
+          <a:xfrm>
+            <a:off x="51147" y="2513180"/>
+            <a:ext cx="2075825" cy="304597"/>
+            <a:chOff x="106563" y="2459890"/>
+            <a:chExt cx="2075825" cy="304597"/>
+          </a:xfrm>
+        </p:grpSpPr>
+        <p:pic>
+          <p:nvPicPr>
+            <p:cNvPr id="5" name="Graphic 4" descr="Man and woman with solid fill">
+              <a:extLst>
+                <a:ext uri="{FF2B5EF4-FFF2-40B4-BE49-F238E27FC236}">
+                  <a16:creationId xmlns:a16="http://schemas.microsoft.com/office/drawing/2014/main" id="{E4CA11B4-B961-5282-9FC9-958CC82D4CC5}"/>
+                </a:ext>
+              </a:extLst>
+            </p:cNvPr>
+            <p:cNvPicPr>
+              <a:picLocks noChangeAspect="1"/>
+            </p:cNvPicPr>
+            <p:nvPr/>
+          </p:nvPicPr>
+          <p:blipFill>
+            <a:blip r:embed="rId4">
+              <a:extLst>
+                <a:ext uri="{96DAC541-7B7A-43D3-8B79-37D633B846F1}">
+                  <asvg:svgBlip xmlns:asvg="http://schemas.microsoft.com/office/drawing/2016/SVG/main" r:embed="rId5"/>
+                </a:ext>
+              </a:extLst>
+            </a:blip>
+            <a:stretch>
+              <a:fillRect/>
+            </a:stretch>
+          </p:blipFill>
+          <p:spPr>
+            <a:xfrm>
+              <a:off x="106563" y="2459890"/>
+              <a:ext cx="304597" cy="304597"/>
+            </a:xfrm>
+            <a:prstGeom prst="rect">
+              <a:avLst/>
+            </a:prstGeom>
+          </p:spPr>
+        </p:pic>
+        <p:sp>
+          <p:nvSpPr>
+            <p:cNvPr id="12" name="TextBox 11">
+              <a:extLst>
+                <a:ext uri="{FF2B5EF4-FFF2-40B4-BE49-F238E27FC236}">
+                  <a16:creationId xmlns:a16="http://schemas.microsoft.com/office/drawing/2014/main" id="{3EABF468-A2DF-5E64-12C2-1F9F68826261}"/>
+                </a:ext>
+              </a:extLst>
+            </p:cNvPr>
+            <p:cNvSpPr txBox="1"/>
+            <p:nvPr/>
+          </p:nvSpPr>
+          <p:spPr>
+            <a:xfrm>
+              <a:off x="458839" y="2462026"/>
+              <a:ext cx="1723549" cy="276999"/>
+            </a:xfrm>
+            <a:prstGeom prst="rect">
+              <a:avLst/>
+            </a:prstGeom>
+            <a:noFill/>
+          </p:spPr>
+          <p:txBody>
+            <a:bodyPr wrap="none" rtlCol="0">
+              <a:spAutoFit/>
+            </a:bodyPr>
+            <a:lstStyle/>
+            <a:p>
+              <a:r>
+                <a:rPr lang="pt-BR" sz="1200" b="1" dirty="0">
+                  <a:solidFill>
+                    <a:srgbClr val="075293"/>
+                  </a:solidFill>
+                  <a:latin typeface="Source Sans Pro" panose="020B0503030403020204" pitchFamily="34" charset="0"/>
+                  <a:ea typeface="Source Sans Pro" panose="020B0503030403020204" pitchFamily="34" charset="0"/>
+                </a:rPr>
+                <a:t>Tech Diversity: Gender</a:t>
+              </a:r>
+            </a:p>
+          </p:txBody>
+        </p:sp>
+      </p:grpSp>
+      <p:grpSp>
+        <p:nvGrpSpPr>
+          <p:cNvPr id="18" name="Group 17">
+            <a:extLst>
+              <a:ext uri="{FF2B5EF4-FFF2-40B4-BE49-F238E27FC236}">
+                <a16:creationId xmlns:a16="http://schemas.microsoft.com/office/drawing/2014/main" id="{E9EE5D7D-236C-CD2D-C9DC-31FCDF1A0637}"/>
+              </a:ext>
+            </a:extLst>
+          </p:cNvPr>
+          <p:cNvGrpSpPr/>
+          <p:nvPr/>
+        </p:nvGrpSpPr>
+        <p:grpSpPr>
+          <a:xfrm>
+            <a:off x="72828" y="3123561"/>
+            <a:ext cx="1956454" cy="304597"/>
+            <a:chOff x="128244" y="2979395"/>
+            <a:chExt cx="1956454" cy="304597"/>
+          </a:xfrm>
+        </p:grpSpPr>
+        <p:pic>
+          <p:nvPicPr>
+            <p:cNvPr id="11" name="Graphic 10" descr="Office worker male with solid fill">
+              <a:extLst>
+                <a:ext uri="{FF2B5EF4-FFF2-40B4-BE49-F238E27FC236}">
+                  <a16:creationId xmlns:a16="http://schemas.microsoft.com/office/drawing/2014/main" id="{9B78A062-B93B-793E-57BB-FAA0EC8449E7}"/>
+                </a:ext>
+              </a:extLst>
+            </p:cNvPr>
+            <p:cNvPicPr>
+              <a:picLocks noChangeAspect="1"/>
+            </p:cNvPicPr>
+            <p:nvPr/>
+          </p:nvPicPr>
+          <p:blipFill>
+            <a:blip r:embed="rId6">
+              <a:extLst>
+                <a:ext uri="{96DAC541-7B7A-43D3-8B79-37D633B846F1}">
+                  <asvg:svgBlip xmlns:asvg="http://schemas.microsoft.com/office/drawing/2016/SVG/main" r:embed="rId7"/>
+                </a:ext>
+              </a:extLst>
+            </a:blip>
+            <a:stretch>
+              <a:fillRect/>
+            </a:stretch>
+          </p:blipFill>
+          <p:spPr>
+            <a:xfrm>
+              <a:off x="128244" y="2979395"/>
+              <a:ext cx="304597" cy="304597"/>
+            </a:xfrm>
+            <a:prstGeom prst="rect">
+              <a:avLst/>
+            </a:prstGeom>
+          </p:spPr>
+        </p:pic>
+        <p:sp>
+          <p:nvSpPr>
+            <p:cNvPr id="13" name="TextBox 12">
+              <a:extLst>
+                <a:ext uri="{FF2B5EF4-FFF2-40B4-BE49-F238E27FC236}">
+                  <a16:creationId xmlns:a16="http://schemas.microsoft.com/office/drawing/2014/main" id="{D618F58B-62A5-04C6-8D81-17BDC230F483}"/>
+                </a:ext>
+              </a:extLst>
+            </p:cNvPr>
+            <p:cNvSpPr txBox="1"/>
+            <p:nvPr/>
+          </p:nvSpPr>
+          <p:spPr>
+            <a:xfrm>
+              <a:off x="449314" y="2979396"/>
+              <a:ext cx="1635384" cy="276999"/>
+            </a:xfrm>
+            <a:prstGeom prst="rect">
+              <a:avLst/>
+            </a:prstGeom>
+            <a:noFill/>
+          </p:spPr>
+          <p:txBody>
+            <a:bodyPr wrap="none" rtlCol="0">
+              <a:spAutoFit/>
+            </a:bodyPr>
+            <a:lstStyle/>
+            <a:p>
+              <a:r>
+                <a:rPr lang="pt-BR" sz="1200" b="1" dirty="0">
+                  <a:solidFill>
+                    <a:srgbClr val="E2E2E2"/>
+                  </a:solidFill>
+                  <a:latin typeface="Source Sans Pro" panose="020B0503030403020204" pitchFamily="34" charset="0"/>
+                  <a:ea typeface="Source Sans Pro" panose="020B0503030403020204" pitchFamily="34" charset="0"/>
+                </a:rPr>
+                <a:t>Pay GAP By Job: 2017</a:t>
+              </a:r>
+            </a:p>
+          </p:txBody>
+        </p:sp>
+      </p:grpSp>
+      <p:grpSp>
+        <p:nvGrpSpPr>
+          <p:cNvPr id="16" name="Group 15">
+            <a:extLst>
+              <a:ext uri="{FF2B5EF4-FFF2-40B4-BE49-F238E27FC236}">
+                <a16:creationId xmlns:a16="http://schemas.microsoft.com/office/drawing/2014/main" id="{C8C9CB23-D268-D64F-1309-D850397D8638}"/>
+              </a:ext>
+            </a:extLst>
+          </p:cNvPr>
+          <p:cNvGrpSpPr/>
+          <p:nvPr/>
+        </p:nvGrpSpPr>
+        <p:grpSpPr>
+          <a:xfrm>
+            <a:off x="72828" y="4311187"/>
+            <a:ext cx="2127882" cy="276999"/>
+            <a:chOff x="147819" y="3983051"/>
+            <a:chExt cx="2127882" cy="276999"/>
+          </a:xfrm>
+        </p:grpSpPr>
+        <p:pic>
+          <p:nvPicPr>
+            <p:cNvPr id="7" name="Graphic 6" descr="Artificial Intelligence with solid fill">
+              <a:extLst>
+                <a:ext uri="{FF2B5EF4-FFF2-40B4-BE49-F238E27FC236}">
+                  <a16:creationId xmlns:a16="http://schemas.microsoft.com/office/drawing/2014/main" id="{18BB92AB-8316-B7FA-02F1-F72883F07161}"/>
+                </a:ext>
+              </a:extLst>
+            </p:cNvPr>
+            <p:cNvPicPr>
+              <a:picLocks noChangeAspect="1"/>
+            </p:cNvPicPr>
+            <p:nvPr/>
+          </p:nvPicPr>
+          <p:blipFill>
+            <a:blip r:embed="rId8">
+              <a:extLst>
+                <a:ext uri="{96DAC541-7B7A-43D3-8B79-37D633B846F1}">
+                  <asvg:svgBlip xmlns:asvg="http://schemas.microsoft.com/office/drawing/2016/SVG/main" r:embed="rId9"/>
+                </a:ext>
+              </a:extLst>
+            </a:blip>
+            <a:stretch>
+              <a:fillRect/>
+            </a:stretch>
+          </p:blipFill>
+          <p:spPr>
+            <a:xfrm>
+              <a:off x="147819" y="3983051"/>
+              <a:ext cx="271462" cy="271462"/>
+            </a:xfrm>
+            <a:prstGeom prst="rect">
+              <a:avLst/>
+            </a:prstGeom>
+          </p:spPr>
+        </p:pic>
+        <p:sp>
+          <p:nvSpPr>
+            <p:cNvPr id="15" name="TextBox 14">
+              <a:extLst>
+                <a:ext uri="{FF2B5EF4-FFF2-40B4-BE49-F238E27FC236}">
+                  <a16:creationId xmlns:a16="http://schemas.microsoft.com/office/drawing/2014/main" id="{6851D13B-E49A-FDBE-3F0A-6B3991F57303}"/>
+                </a:ext>
+              </a:extLst>
+            </p:cNvPr>
+            <p:cNvSpPr txBox="1"/>
+            <p:nvPr/>
+          </p:nvSpPr>
+          <p:spPr>
+            <a:xfrm>
+              <a:off x="449314" y="3983051"/>
+              <a:ext cx="1826387" cy="276999"/>
+            </a:xfrm>
+            <a:prstGeom prst="rect">
+              <a:avLst/>
+            </a:prstGeom>
+            <a:noFill/>
+          </p:spPr>
+          <p:txBody>
+            <a:bodyPr wrap="square" rtlCol="0">
+              <a:spAutoFit/>
+            </a:bodyPr>
+            <a:lstStyle/>
+            <a:p>
+              <a:r>
+                <a:rPr lang="pt-BR" sz="1200" b="1" dirty="0">
+                  <a:solidFill>
+                    <a:srgbClr val="E2E2E2"/>
+                  </a:solidFill>
+                  <a:latin typeface="Source Sans Pro" panose="020B0503030403020204" pitchFamily="34" charset="0"/>
+                  <a:ea typeface="Source Sans Pro" panose="020B0503030403020204" pitchFamily="34" charset="0"/>
+                </a:rPr>
+                <a:t>AI Influence in Students</a:t>
+              </a:r>
+            </a:p>
+          </p:txBody>
+        </p:sp>
+      </p:grpSp>
+      <p:grpSp>
+        <p:nvGrpSpPr>
+          <p:cNvPr id="17" name="Group 16">
+            <a:extLst>
+              <a:ext uri="{FF2B5EF4-FFF2-40B4-BE49-F238E27FC236}">
+                <a16:creationId xmlns:a16="http://schemas.microsoft.com/office/drawing/2014/main" id="{C7DC686D-EEB5-7607-DBD6-650C31D40B6A}"/>
+              </a:ext>
+            </a:extLst>
+          </p:cNvPr>
+          <p:cNvGrpSpPr/>
+          <p:nvPr/>
+        </p:nvGrpSpPr>
+        <p:grpSpPr>
+          <a:xfrm>
+            <a:off x="86914" y="3733942"/>
+            <a:ext cx="2077206" cy="281925"/>
+            <a:chOff x="161380" y="3479408"/>
+            <a:chExt cx="2077206" cy="281925"/>
+          </a:xfrm>
+        </p:grpSpPr>
+        <p:pic>
+          <p:nvPicPr>
+            <p:cNvPr id="9" name="Graphic 8" descr="Flying Money with solid fill">
+              <a:extLst>
+                <a:ext uri="{FF2B5EF4-FFF2-40B4-BE49-F238E27FC236}">
+                  <a16:creationId xmlns:a16="http://schemas.microsoft.com/office/drawing/2014/main" id="{96F550C4-E043-AD8F-A4FD-EDC041A53FE8}"/>
+                </a:ext>
+              </a:extLst>
+            </p:cNvPr>
+            <p:cNvPicPr>
+              <a:picLocks noChangeAspect="1"/>
+            </p:cNvPicPr>
+            <p:nvPr/>
+          </p:nvPicPr>
+          <p:blipFill>
+            <a:blip r:embed="rId10">
+              <a:extLst>
+                <a:ext uri="{96DAC541-7B7A-43D3-8B79-37D633B846F1}">
+                  <asvg:svgBlip xmlns:asvg="http://schemas.microsoft.com/office/drawing/2016/SVG/main" r:embed="rId11"/>
+                </a:ext>
+              </a:extLst>
+            </a:blip>
+            <a:stretch>
+              <a:fillRect/>
+            </a:stretch>
+          </p:blipFill>
+          <p:spPr>
+            <a:xfrm>
+              <a:off x="161380" y="3479408"/>
+              <a:ext cx="271462" cy="271462"/>
+            </a:xfrm>
+            <a:prstGeom prst="rect">
+              <a:avLst/>
+            </a:prstGeom>
+          </p:spPr>
+        </p:pic>
+        <p:sp>
+          <p:nvSpPr>
+            <p:cNvPr id="14" name="TextBox 13">
+              <a:extLst>
+                <a:ext uri="{FF2B5EF4-FFF2-40B4-BE49-F238E27FC236}">
+                  <a16:creationId xmlns:a16="http://schemas.microsoft.com/office/drawing/2014/main" id="{D7E5A69A-3F6D-0014-145D-F82608C1DCC7}"/>
+                </a:ext>
+              </a:extLst>
+            </p:cNvPr>
+            <p:cNvSpPr txBox="1"/>
+            <p:nvPr/>
+          </p:nvSpPr>
+          <p:spPr>
+            <a:xfrm>
+              <a:off x="449314" y="3484334"/>
+              <a:ext cx="1789272" cy="276999"/>
+            </a:xfrm>
+            <a:prstGeom prst="rect">
+              <a:avLst/>
+            </a:prstGeom>
+            <a:noFill/>
+          </p:spPr>
+          <p:txBody>
+            <a:bodyPr wrap="none" rtlCol="0">
+              <a:spAutoFit/>
+            </a:bodyPr>
+            <a:lstStyle/>
+            <a:p>
+              <a:r>
+                <a:rPr lang="pt-BR" sz="1200" b="1" dirty="0">
+                  <a:solidFill>
+                    <a:srgbClr val="E2E2E2"/>
+                  </a:solidFill>
+                  <a:latin typeface="Source Sans Pro" panose="020B0503030403020204" pitchFamily="34" charset="0"/>
+                  <a:ea typeface="Source Sans Pro" panose="020B0503030403020204" pitchFamily="34" charset="0"/>
+                </a:rPr>
+                <a:t>Pay GAP By: 1997-2017</a:t>
+              </a:r>
+            </a:p>
+          </p:txBody>
+        </p:sp>
+      </p:grpSp>
+      <p:sp>
+        <p:nvSpPr>
+          <p:cNvPr id="21" name="TextBox 20">
+            <a:extLst>
+              <a:ext uri="{FF2B5EF4-FFF2-40B4-BE49-F238E27FC236}">
+                <a16:creationId xmlns:a16="http://schemas.microsoft.com/office/drawing/2014/main" id="{5E424BDB-A06E-F999-4B9B-0B9C01A57D59}"/>
+              </a:ext>
+            </a:extLst>
+          </p:cNvPr>
+          <p:cNvSpPr txBox="1"/>
+          <p:nvPr/>
+        </p:nvSpPr>
+        <p:spPr>
+          <a:xfrm>
+            <a:off x="369329" y="1080810"/>
+            <a:ext cx="1428596" cy="400110"/>
+          </a:xfrm>
+          <a:prstGeom prst="rect">
+            <a:avLst/>
+          </a:prstGeom>
+          <a:noFill/>
+        </p:spPr>
+        <p:txBody>
+          <a:bodyPr wrap="none" rtlCol="0">
+            <a:spAutoFit/>
+          </a:bodyPr>
+          <a:lstStyle/>
+          <a:p>
+            <a:pPr algn="ctr"/>
+            <a:r>
+              <a:rPr lang="pt-BR" sz="2000" b="1" dirty="0">
+                <a:solidFill>
+                  <a:srgbClr val="E2E2E2"/>
+                </a:solidFill>
+                <a:latin typeface="Source Sans Pro" panose="020B0503030403020204" pitchFamily="34" charset="0"/>
+                <a:ea typeface="Roboto" panose="02000000000000000000" pitchFamily="2" charset="0"/>
+              </a:rPr>
+              <a:t>ANALYTICS</a:t>
+            </a:r>
+            <a:endParaRPr lang="pt-BR" b="1" dirty="0">
+              <a:solidFill>
+                <a:srgbClr val="E2E2E2"/>
+              </a:solidFill>
+              <a:latin typeface="Source Sans Pro" panose="020B0503030403020204" pitchFamily="34" charset="0"/>
+              <a:ea typeface="Roboto" panose="02000000000000000000" pitchFamily="2" charset="0"/>
+            </a:endParaRPr>
+          </a:p>
+        </p:txBody>
+      </p:sp>
+      <p:grpSp>
+        <p:nvGrpSpPr>
+          <p:cNvPr id="8" name="Group 7">
+            <a:extLst>
+              <a:ext uri="{FF2B5EF4-FFF2-40B4-BE49-F238E27FC236}">
+                <a16:creationId xmlns:a16="http://schemas.microsoft.com/office/drawing/2014/main" id="{A2E1ADA0-577E-6849-D5EF-46579DCFCE5F}"/>
+              </a:ext>
+            </a:extLst>
+          </p:cNvPr>
+          <p:cNvGrpSpPr>
+            <a:grpSpLocks noChangeAspect="1"/>
+          </p:cNvGrpSpPr>
+          <p:nvPr/>
+        </p:nvGrpSpPr>
+        <p:grpSpPr>
+          <a:xfrm>
+            <a:off x="2825625" y="802500"/>
+            <a:ext cx="540000" cy="540000"/>
+            <a:chOff x="2825625" y="802500"/>
+            <a:chExt cx="540000" cy="540000"/>
+          </a:xfrm>
+        </p:grpSpPr>
+        <p:sp>
+          <p:nvSpPr>
+            <p:cNvPr id="28" name="Oval 27">
+              <a:extLst>
+                <a:ext uri="{FF2B5EF4-FFF2-40B4-BE49-F238E27FC236}">
+                  <a16:creationId xmlns:a16="http://schemas.microsoft.com/office/drawing/2014/main" id="{D596DB39-2948-6A7E-AA66-896557C9EDB9}"/>
+                </a:ext>
+              </a:extLst>
+            </p:cNvPr>
+            <p:cNvSpPr/>
+            <p:nvPr/>
+          </p:nvSpPr>
+          <p:spPr>
+            <a:xfrm>
+              <a:off x="2825625" y="802500"/>
+              <a:ext cx="540000" cy="540000"/>
+            </a:xfrm>
+            <a:prstGeom prst="ellipse">
+              <a:avLst/>
+            </a:prstGeom>
+            <a:solidFill>
+              <a:srgbClr val="E2E2E2"/>
+            </a:solidFill>
+            <a:ln>
+              <a:noFill/>
+            </a:ln>
+          </p:spPr>
+          <p:style>
+            <a:lnRef idx="2">
+              <a:schemeClr val="accent1">
+                <a:shade val="15000"/>
+              </a:schemeClr>
+            </a:lnRef>
+            <a:fillRef idx="1">
+              <a:schemeClr val="accent1"/>
+            </a:fillRef>
+            <a:effectRef idx="0">
+              <a:schemeClr val="accent1"/>
+            </a:effectRef>
+            <a:fontRef idx="minor">
+              <a:schemeClr val="lt1"/>
+            </a:fontRef>
+          </p:style>
+          <p:txBody>
+            <a:bodyPr rtlCol="0" anchor="ctr"/>
+            <a:lstStyle/>
+            <a:p>
+              <a:pPr algn="ctr"/>
+              <a:endParaRPr lang="pt-BR"/>
+            </a:p>
+          </p:txBody>
+        </p:sp>
+        <p:pic>
+          <p:nvPicPr>
+            <p:cNvPr id="31" name="Graphic 30" descr="School boy with solid fill">
+              <a:extLst>
+                <a:ext uri="{FF2B5EF4-FFF2-40B4-BE49-F238E27FC236}">
+                  <a16:creationId xmlns:a16="http://schemas.microsoft.com/office/drawing/2014/main" id="{BEEA4590-FA74-7DA6-4C41-591312402F06}"/>
+                </a:ext>
+              </a:extLst>
+            </p:cNvPr>
+            <p:cNvPicPr>
+              <a:picLocks noChangeAspect="1"/>
+            </p:cNvPicPr>
+            <p:nvPr/>
+          </p:nvPicPr>
+          <p:blipFill>
+            <a:blip r:embed="rId12">
+              <a:extLst>
+                <a:ext uri="{96DAC541-7B7A-43D3-8B79-37D633B846F1}">
+                  <asvg:svgBlip xmlns:asvg="http://schemas.microsoft.com/office/drawing/2016/SVG/main" r:embed="rId13"/>
+                </a:ext>
+              </a:extLst>
+            </a:blip>
+            <a:stretch>
+              <a:fillRect/>
+            </a:stretch>
+          </p:blipFill>
+          <p:spPr>
+            <a:xfrm>
+              <a:off x="2873251" y="852241"/>
+              <a:ext cx="441450" cy="441450"/>
+            </a:xfrm>
+            <a:prstGeom prst="rect">
+              <a:avLst/>
+            </a:prstGeom>
+          </p:spPr>
+        </p:pic>
+      </p:grpSp>
+      <p:sp>
+        <p:nvSpPr>
+          <p:cNvPr id="32" name="TextBox 31">
+            <a:extLst>
+              <a:ext uri="{FF2B5EF4-FFF2-40B4-BE49-F238E27FC236}">
+                <a16:creationId xmlns:a16="http://schemas.microsoft.com/office/drawing/2014/main" id="{D372DA6D-A074-4639-487C-6A5E33C9034E}"/>
+              </a:ext>
+            </a:extLst>
+          </p:cNvPr>
+          <p:cNvSpPr txBox="1"/>
+          <p:nvPr/>
+        </p:nvSpPr>
+        <p:spPr>
+          <a:xfrm>
+            <a:off x="3413251" y="926921"/>
+            <a:ext cx="1848583" cy="307777"/>
+          </a:xfrm>
+          <a:prstGeom prst="rect">
+            <a:avLst/>
+          </a:prstGeom>
+          <a:noFill/>
+        </p:spPr>
+        <p:txBody>
+          <a:bodyPr wrap="none" rtlCol="0">
+            <a:spAutoFit/>
+          </a:bodyPr>
+          <a:lstStyle/>
+          <a:p>
+            <a:r>
+              <a:rPr lang="pt-BR" sz="1400" b="1" dirty="0">
+                <a:latin typeface="Roboto" panose="02000000000000000000" pitchFamily="2" charset="0"/>
+                <a:ea typeface="Roboto" panose="02000000000000000000" pitchFamily="2" charset="0"/>
+              </a:rPr>
+              <a:t>Welcome back, </a:t>
+            </a:r>
+            <a:r>
+              <a:rPr lang="pt-BR" sz="1400" dirty="0">
+                <a:latin typeface="Roboto" panose="02000000000000000000" pitchFamily="2" charset="0"/>
+                <a:ea typeface="Roboto" panose="02000000000000000000" pitchFamily="2" charset="0"/>
+              </a:rPr>
+              <a:t>user</a:t>
+            </a:r>
+            <a:r>
+              <a:rPr lang="pt-BR" sz="1400" b="1" dirty="0">
+                <a:latin typeface="Roboto" panose="02000000000000000000" pitchFamily="2" charset="0"/>
+                <a:ea typeface="Roboto" panose="02000000000000000000" pitchFamily="2" charset="0"/>
+              </a:rPr>
+              <a:t>!</a:t>
+            </a:r>
+            <a:endParaRPr lang="pt-BR" sz="1200" b="1" dirty="0">
+              <a:latin typeface="Roboto" panose="02000000000000000000" pitchFamily="2" charset="0"/>
+              <a:ea typeface="Roboto" panose="02000000000000000000" pitchFamily="2" charset="0"/>
+            </a:endParaRPr>
+          </a:p>
+        </p:txBody>
+      </p:sp>
+      <p:sp>
+        <p:nvSpPr>
+          <p:cNvPr id="4" name="TextBox 3">
+            <a:extLst>
+              <a:ext uri="{FF2B5EF4-FFF2-40B4-BE49-F238E27FC236}">
+                <a16:creationId xmlns:a16="http://schemas.microsoft.com/office/drawing/2014/main" id="{50D1CC90-7A0D-F990-17F7-45013920C489}"/>
+              </a:ext>
+            </a:extLst>
+          </p:cNvPr>
+          <p:cNvSpPr txBox="1"/>
+          <p:nvPr/>
+        </p:nvSpPr>
+        <p:spPr>
+          <a:xfrm rot="19731122">
+            <a:off x="4163410" y="2889128"/>
+            <a:ext cx="5957455" cy="2123658"/>
+          </a:xfrm>
+          <a:prstGeom prst="rect">
+            <a:avLst/>
+          </a:prstGeom>
+          <a:noFill/>
+        </p:spPr>
+        <p:txBody>
+          <a:bodyPr wrap="square" rtlCol="0">
+            <a:spAutoFit/>
+          </a:bodyPr>
+          <a:lstStyle/>
+          <a:p>
+            <a:pPr algn="ctr"/>
+            <a:r>
+              <a:rPr lang="pt-BR" sz="6600" i="1" dirty="0">
+                <a:latin typeface="Roboto" panose="02000000000000000000" pitchFamily="2" charset="0"/>
+                <a:ea typeface="Roboto" panose="02000000000000000000" pitchFamily="2" charset="0"/>
+              </a:rPr>
+              <a:t>CHARTS TO BE ADDED HERE!</a:t>
+            </a:r>
+          </a:p>
+        </p:txBody>
+      </p:sp>
+    </p:spTree>
+    <p:extLst>
+      <p:ext uri="{BB962C8B-B14F-4D97-AF65-F5344CB8AC3E}">
+        <p14:creationId xmlns:p14="http://schemas.microsoft.com/office/powerpoint/2010/main" val="2505743146"/>
+      </p:ext>
+    </p:extLst>
+  </p:cSld>
+  <p:clrMapOvr>
+    <a:masterClrMapping/>
+  </p:clrMapOvr>
+</p:sld>
+</file>
+
+<file path=ppt/slides/slide20.xml><?xml version="1.0" encoding="utf-8"?>
 <p:sld xmlns:a="http://schemas.openxmlformats.org/drawingml/2006/main" xmlns:r="http://schemas.openxmlformats.org/officeDocument/2006/relationships" xmlns:p="http://schemas.openxmlformats.org/presentationml/2006/main">
   <p:cSld>
     <p:spTree>
@@ -7872,7 +9959,43 @@
 </p:sld>
 </file>
 
-<file path=ppt/slides/slide2.xml><?xml version="1.0" encoding="utf-8"?>
+<file path=ppt/slides/slide21.xml><?xml version="1.0" encoding="utf-8"?>
+<p:sld xmlns:a="http://schemas.openxmlformats.org/drawingml/2006/main" xmlns:r="http://schemas.openxmlformats.org/officeDocument/2006/relationships" xmlns:p="http://schemas.openxmlformats.org/presentationml/2006/main">
+  <p:cSld>
+    <p:spTree>
+      <p:nvGrpSpPr>
+        <p:cNvPr id="1" name="">
+          <a:extLst>
+            <a:ext uri="{FF2B5EF4-FFF2-40B4-BE49-F238E27FC236}">
+              <a16:creationId xmlns:a16="http://schemas.microsoft.com/office/drawing/2014/main" id="{2532F18D-4831-0776-7F62-A0E81EEDD67B}"/>
+            </a:ext>
+          </a:extLst>
+        </p:cNvPr>
+        <p:cNvGrpSpPr/>
+        <p:nvPr/>
+      </p:nvGrpSpPr>
+      <p:grpSpPr>
+        <a:xfrm>
+          <a:off x="0" y="0"/>
+          <a:ext cx="0" cy="0"/>
+          <a:chOff x="0" y="0"/>
+          <a:chExt cx="0" cy="0"/>
+        </a:xfrm>
+      </p:grpSpPr>
+    </p:spTree>
+    <p:extLst>
+      <p:ext uri="{BB962C8B-B14F-4D97-AF65-F5344CB8AC3E}">
+        <p14:creationId xmlns:p14="http://schemas.microsoft.com/office/powerpoint/2010/main" val="3306800868"/>
+      </p:ext>
+    </p:extLst>
+  </p:cSld>
+  <p:clrMapOvr>
+    <a:masterClrMapping/>
+  </p:clrMapOvr>
+</p:sld>
+</file>
+
+<file path=ppt/slides/slide3.xml><?xml version="1.0" encoding="utf-8"?>
 <p:sld xmlns:a="http://schemas.openxmlformats.org/drawingml/2006/main" xmlns:r="http://schemas.openxmlformats.org/officeDocument/2006/relationships" xmlns:p="http://schemas.openxmlformats.org/presentationml/2006/main">
   <p:cSld>
     <p:spTree>
@@ -8700,43 +10823,7 @@
 </p:sld>
 </file>
 
-<file path=ppt/slides/slide20.xml><?xml version="1.0" encoding="utf-8"?>
-<p:sld xmlns:a="http://schemas.openxmlformats.org/drawingml/2006/main" xmlns:r="http://schemas.openxmlformats.org/officeDocument/2006/relationships" xmlns:p="http://schemas.openxmlformats.org/presentationml/2006/main">
-  <p:cSld>
-    <p:spTree>
-      <p:nvGrpSpPr>
-        <p:cNvPr id="1" name="">
-          <a:extLst>
-            <a:ext uri="{FF2B5EF4-FFF2-40B4-BE49-F238E27FC236}">
-              <a16:creationId xmlns:a16="http://schemas.microsoft.com/office/drawing/2014/main" id="{2532F18D-4831-0776-7F62-A0E81EEDD67B}"/>
-            </a:ext>
-          </a:extLst>
-        </p:cNvPr>
-        <p:cNvGrpSpPr/>
-        <p:nvPr/>
-      </p:nvGrpSpPr>
-      <p:grpSpPr>
-        <a:xfrm>
-          <a:off x="0" y="0"/>
-          <a:ext cx="0" cy="0"/>
-          <a:chOff x="0" y="0"/>
-          <a:chExt cx="0" cy="0"/>
-        </a:xfrm>
-      </p:grpSpPr>
-    </p:spTree>
-    <p:extLst>
-      <p:ext uri="{BB962C8B-B14F-4D97-AF65-F5344CB8AC3E}">
-        <p14:creationId xmlns:p14="http://schemas.microsoft.com/office/powerpoint/2010/main" val="3306800868"/>
-      </p:ext>
-    </p:extLst>
-  </p:cSld>
-  <p:clrMapOvr>
-    <a:masterClrMapping/>
-  </p:clrMapOvr>
-</p:sld>
-</file>
-
-<file path=ppt/slides/slide3.xml><?xml version="1.0" encoding="utf-8"?>
+<file path=ppt/slides/slide4.xml><?xml version="1.0" encoding="utf-8"?>
 <p:sld xmlns:a="http://schemas.openxmlformats.org/drawingml/2006/main" xmlns:r="http://schemas.openxmlformats.org/officeDocument/2006/relationships" xmlns:p="http://schemas.openxmlformats.org/presentationml/2006/main">
   <p:cSld>
     <p:spTree>
@@ -8767,7 +10854,7 @@
         </p:nvSpPr>
         <p:spPr>
           <a:xfrm>
-            <a:off x="1226590" y="2699328"/>
+            <a:off x="1355899" y="1328669"/>
             <a:ext cx="1514763" cy="1459345"/>
           </a:xfrm>
           <a:prstGeom prst="ellipse">
@@ -8819,7 +10906,7 @@
         </p:nvSpPr>
         <p:spPr>
           <a:xfrm>
-            <a:off x="3967943" y="2699328"/>
+            <a:off x="4097252" y="1328669"/>
             <a:ext cx="1514763" cy="1459345"/>
           </a:xfrm>
           <a:prstGeom prst="ellipse">
@@ -8871,7 +10958,7 @@
         </p:nvSpPr>
         <p:spPr>
           <a:xfrm>
-            <a:off x="6709296" y="2699328"/>
+            <a:off x="6838605" y="1328669"/>
             <a:ext cx="1514763" cy="1459345"/>
           </a:xfrm>
           <a:prstGeom prst="ellipse">
@@ -8923,7 +11010,7 @@
         </p:nvSpPr>
         <p:spPr>
           <a:xfrm>
-            <a:off x="9450649" y="2699328"/>
+            <a:off x="9579958" y="1328669"/>
             <a:ext cx="1514763" cy="1459345"/>
           </a:xfrm>
           <a:prstGeom prst="ellipse">
@@ -9014,7 +11101,7 @@
         </p:nvSpPr>
         <p:spPr>
           <a:xfrm>
-            <a:off x="941858" y="4251039"/>
+            <a:off x="1071167" y="2880380"/>
             <a:ext cx="2084225" cy="523220"/>
           </a:xfrm>
           <a:prstGeom prst="rect">
@@ -9075,7 +11162,7 @@
         </p:nvSpPr>
         <p:spPr>
           <a:xfrm>
-            <a:off x="3518929" y="4251039"/>
+            <a:off x="3648238" y="2880380"/>
             <a:ext cx="2412789" cy="523220"/>
           </a:xfrm>
           <a:prstGeom prst="rect">
@@ -9136,7 +11223,7 @@
         </p:nvSpPr>
         <p:spPr>
           <a:xfrm>
-            <a:off x="6424564" y="4251039"/>
+            <a:off x="6553873" y="2880380"/>
             <a:ext cx="2084225" cy="523220"/>
           </a:xfrm>
           <a:prstGeom prst="rect">
@@ -9197,7 +11284,7 @@
         </p:nvSpPr>
         <p:spPr>
           <a:xfrm>
-            <a:off x="9165917" y="4251039"/>
+            <a:off x="9295226" y="2880380"/>
             <a:ext cx="2084225" cy="523220"/>
           </a:xfrm>
           <a:prstGeom prst="rect">
@@ -9279,6 +11366,552 @@
               </a:rPr>
               <a:t>Source: https://www.color-blindness.com/color-name-hue/</a:t>
             </a:r>
+          </a:p>
+        </p:txBody>
+      </p:sp>
+      <p:sp>
+        <p:nvSpPr>
+          <p:cNvPr id="2" name="Oval 1">
+            <a:extLst>
+              <a:ext uri="{FF2B5EF4-FFF2-40B4-BE49-F238E27FC236}">
+                <a16:creationId xmlns:a16="http://schemas.microsoft.com/office/drawing/2014/main" id="{6A181F17-13A7-CA0F-3828-F5657C0DD170}"/>
+              </a:ext>
+            </a:extLst>
+          </p:cNvPr>
+          <p:cNvSpPr/>
+          <p:nvPr/>
+        </p:nvSpPr>
+        <p:spPr>
+          <a:xfrm>
+            <a:off x="1355899" y="4054079"/>
+            <a:ext cx="1514763" cy="1459345"/>
+          </a:xfrm>
+          <a:prstGeom prst="ellipse">
+            <a:avLst/>
+          </a:prstGeom>
+          <a:solidFill>
+            <a:srgbClr val="B2BEB5"/>
+          </a:solidFill>
+          <a:ln>
+            <a:noFill/>
+          </a:ln>
+        </p:spPr>
+        <p:style>
+          <a:lnRef idx="2">
+            <a:schemeClr val="accent1">
+              <a:shade val="15000"/>
+            </a:schemeClr>
+          </a:lnRef>
+          <a:fillRef idx="1">
+            <a:schemeClr val="accent1"/>
+          </a:fillRef>
+          <a:effectRef idx="0">
+            <a:schemeClr val="accent1"/>
+          </a:effectRef>
+          <a:fontRef idx="minor">
+            <a:schemeClr val="lt1"/>
+          </a:fontRef>
+        </p:style>
+        <p:txBody>
+          <a:bodyPr rtlCol="0" anchor="ctr"/>
+          <a:lstStyle/>
+          <a:p>
+            <a:pPr algn="ctr"/>
+            <a:endParaRPr lang="pt-BR"/>
+          </a:p>
+        </p:txBody>
+      </p:sp>
+      <p:sp>
+        <p:nvSpPr>
+          <p:cNvPr id="7" name="Oval 6">
+            <a:extLst>
+              <a:ext uri="{FF2B5EF4-FFF2-40B4-BE49-F238E27FC236}">
+                <a16:creationId xmlns:a16="http://schemas.microsoft.com/office/drawing/2014/main" id="{86409F89-21FD-EC0A-63CD-822E7B21A510}"/>
+              </a:ext>
+            </a:extLst>
+          </p:cNvPr>
+          <p:cNvSpPr/>
+          <p:nvPr/>
+        </p:nvSpPr>
+        <p:spPr>
+          <a:xfrm>
+            <a:off x="4097252" y="4054079"/>
+            <a:ext cx="1514763" cy="1459345"/>
+          </a:xfrm>
+          <a:prstGeom prst="ellipse">
+            <a:avLst/>
+          </a:prstGeom>
+          <a:solidFill>
+            <a:srgbClr val="007C91"/>
+          </a:solidFill>
+          <a:ln>
+            <a:noFill/>
+          </a:ln>
+        </p:spPr>
+        <p:style>
+          <a:lnRef idx="2">
+            <a:schemeClr val="accent1">
+              <a:shade val="15000"/>
+            </a:schemeClr>
+          </a:lnRef>
+          <a:fillRef idx="1">
+            <a:schemeClr val="accent1"/>
+          </a:fillRef>
+          <a:effectRef idx="0">
+            <a:schemeClr val="accent1"/>
+          </a:effectRef>
+          <a:fontRef idx="minor">
+            <a:schemeClr val="lt1"/>
+          </a:fontRef>
+        </p:style>
+        <p:txBody>
+          <a:bodyPr rtlCol="0" anchor="ctr"/>
+          <a:lstStyle/>
+          <a:p>
+            <a:pPr algn="ctr"/>
+            <a:endParaRPr lang="pt-BR"/>
+          </a:p>
+        </p:txBody>
+      </p:sp>
+      <p:sp>
+        <p:nvSpPr>
+          <p:cNvPr id="14" name="Oval 13">
+            <a:extLst>
+              <a:ext uri="{FF2B5EF4-FFF2-40B4-BE49-F238E27FC236}">
+                <a16:creationId xmlns:a16="http://schemas.microsoft.com/office/drawing/2014/main" id="{DAAC931D-7C36-6AF5-0C2C-1EDC9F08C46D}"/>
+              </a:ext>
+            </a:extLst>
+          </p:cNvPr>
+          <p:cNvSpPr/>
+          <p:nvPr/>
+        </p:nvSpPr>
+        <p:spPr>
+          <a:xfrm>
+            <a:off x="6838605" y="4054079"/>
+            <a:ext cx="1514763" cy="1459345"/>
+          </a:xfrm>
+          <a:prstGeom prst="ellipse">
+            <a:avLst/>
+          </a:prstGeom>
+          <a:solidFill>
+            <a:srgbClr val="E66100"/>
+          </a:solidFill>
+          <a:ln>
+            <a:noFill/>
+          </a:ln>
+        </p:spPr>
+        <p:style>
+          <a:lnRef idx="2">
+            <a:schemeClr val="accent1">
+              <a:shade val="15000"/>
+            </a:schemeClr>
+          </a:lnRef>
+          <a:fillRef idx="1">
+            <a:schemeClr val="accent1"/>
+          </a:fillRef>
+          <a:effectRef idx="0">
+            <a:schemeClr val="accent1"/>
+          </a:effectRef>
+          <a:fontRef idx="minor">
+            <a:schemeClr val="lt1"/>
+          </a:fontRef>
+        </p:style>
+        <p:txBody>
+          <a:bodyPr rtlCol="0" anchor="ctr"/>
+          <a:lstStyle/>
+          <a:p>
+            <a:pPr algn="ctr"/>
+            <a:endParaRPr lang="pt-BR"/>
+          </a:p>
+        </p:txBody>
+      </p:sp>
+      <p:sp>
+        <p:nvSpPr>
+          <p:cNvPr id="15" name="Oval 14">
+            <a:extLst>
+              <a:ext uri="{FF2B5EF4-FFF2-40B4-BE49-F238E27FC236}">
+                <a16:creationId xmlns:a16="http://schemas.microsoft.com/office/drawing/2014/main" id="{7A2C82BC-79C4-1A4A-4538-5780E7BC246D}"/>
+              </a:ext>
+            </a:extLst>
+          </p:cNvPr>
+          <p:cNvSpPr/>
+          <p:nvPr/>
+        </p:nvSpPr>
+        <p:spPr>
+          <a:xfrm>
+            <a:off x="9579958" y="4054079"/>
+            <a:ext cx="1514763" cy="1459345"/>
+          </a:xfrm>
+          <a:prstGeom prst="ellipse">
+            <a:avLst/>
+          </a:prstGeom>
+          <a:solidFill>
+            <a:schemeClr val="tx1"/>
+          </a:solidFill>
+          <a:ln>
+            <a:noFill/>
+          </a:ln>
+        </p:spPr>
+        <p:style>
+          <a:lnRef idx="2">
+            <a:schemeClr val="accent1">
+              <a:shade val="15000"/>
+            </a:schemeClr>
+          </a:lnRef>
+          <a:fillRef idx="1">
+            <a:schemeClr val="accent1"/>
+          </a:fillRef>
+          <a:effectRef idx="0">
+            <a:schemeClr val="accent1"/>
+          </a:effectRef>
+          <a:fontRef idx="minor">
+            <a:schemeClr val="lt1"/>
+          </a:fontRef>
+        </p:style>
+        <p:txBody>
+          <a:bodyPr rtlCol="0" anchor="ctr"/>
+          <a:lstStyle/>
+          <a:p>
+            <a:pPr algn="ctr"/>
+            <a:endParaRPr lang="pt-BR"/>
+          </a:p>
+        </p:txBody>
+      </p:sp>
+      <p:sp>
+        <p:nvSpPr>
+          <p:cNvPr id="16" name="TextBox 15">
+            <a:extLst>
+              <a:ext uri="{FF2B5EF4-FFF2-40B4-BE49-F238E27FC236}">
+                <a16:creationId xmlns:a16="http://schemas.microsoft.com/office/drawing/2014/main" id="{EFB9E379-0F25-D2DA-F181-63241D101B61}"/>
+              </a:ext>
+            </a:extLst>
+          </p:cNvPr>
+          <p:cNvSpPr txBox="1"/>
+          <p:nvPr/>
+        </p:nvSpPr>
+        <p:spPr>
+          <a:xfrm>
+            <a:off x="1071167" y="5605790"/>
+            <a:ext cx="2084225" cy="523220"/>
+          </a:xfrm>
+          <a:prstGeom prst="rect">
+            <a:avLst/>
+          </a:prstGeom>
+          <a:noFill/>
+        </p:spPr>
+        <p:txBody>
+          <a:bodyPr wrap="square" rtlCol="0">
+            <a:spAutoFit/>
+          </a:bodyPr>
+          <a:lstStyle/>
+          <a:p>
+            <a:r>
+              <a:rPr lang="pt-BR" sz="1400" b="1" dirty="0">
+                <a:latin typeface="Roboto" panose="02000000000000000000" pitchFamily="2" charset="0"/>
+                <a:ea typeface="Roboto" panose="02000000000000000000" pitchFamily="2" charset="0"/>
+              </a:rPr>
+              <a:t>Color Name: </a:t>
+            </a:r>
+            <a:r>
+              <a:rPr lang="pt-BR" sz="1400" dirty="0">
+                <a:latin typeface="Roboto" panose="02000000000000000000" pitchFamily="2" charset="0"/>
+                <a:ea typeface="Roboto" panose="02000000000000000000" pitchFamily="2" charset="0"/>
+              </a:rPr>
+              <a:t>Loblolly </a:t>
+            </a:r>
+          </a:p>
+          <a:p>
+            <a:r>
+              <a:rPr lang="pt-BR" sz="1400" b="1" dirty="0">
+                <a:latin typeface="Roboto" panose="02000000000000000000" pitchFamily="2" charset="0"/>
+                <a:ea typeface="Roboto" panose="02000000000000000000" pitchFamily="2" charset="0"/>
+              </a:rPr>
+              <a:t>HEX: </a:t>
+            </a:r>
+            <a:r>
+              <a:rPr lang="pt-BR" sz="1400" dirty="0">
+                <a:latin typeface="Roboto" panose="02000000000000000000" pitchFamily="2" charset="0"/>
+                <a:ea typeface="Roboto" panose="02000000000000000000" pitchFamily="2" charset="0"/>
+              </a:rPr>
+              <a:t># B2BEB5</a:t>
+            </a:r>
+          </a:p>
+        </p:txBody>
+      </p:sp>
+      <p:sp>
+        <p:nvSpPr>
+          <p:cNvPr id="17" name="TextBox 16">
+            <a:extLst>
+              <a:ext uri="{FF2B5EF4-FFF2-40B4-BE49-F238E27FC236}">
+                <a16:creationId xmlns:a16="http://schemas.microsoft.com/office/drawing/2014/main" id="{45AFBBAB-E821-81FF-9BD8-BC3D6153F6CA}"/>
+              </a:ext>
+            </a:extLst>
+          </p:cNvPr>
+          <p:cNvSpPr txBox="1"/>
+          <p:nvPr/>
+        </p:nvSpPr>
+        <p:spPr>
+          <a:xfrm>
+            <a:off x="3648238" y="5605790"/>
+            <a:ext cx="2412789" cy="523220"/>
+          </a:xfrm>
+          <a:prstGeom prst="rect">
+            <a:avLst/>
+          </a:prstGeom>
+          <a:noFill/>
+        </p:spPr>
+        <p:txBody>
+          <a:bodyPr wrap="square" rtlCol="0">
+            <a:spAutoFit/>
+          </a:bodyPr>
+          <a:lstStyle/>
+          <a:p>
+            <a:r>
+              <a:rPr lang="pt-BR" sz="1400" b="1" dirty="0">
+                <a:latin typeface="Roboto" panose="02000000000000000000" pitchFamily="2" charset="0"/>
+                <a:ea typeface="Roboto" panose="02000000000000000000" pitchFamily="2" charset="0"/>
+              </a:rPr>
+              <a:t>Color Name: </a:t>
+            </a:r>
+            <a:r>
+              <a:rPr lang="pt-BR" sz="1400" dirty="0">
+                <a:latin typeface="Roboto" panose="02000000000000000000" pitchFamily="2" charset="0"/>
+                <a:ea typeface="Roboto" panose="02000000000000000000" pitchFamily="2" charset="0"/>
+              </a:rPr>
+              <a:t>Dark Cyan </a:t>
+            </a:r>
+          </a:p>
+          <a:p>
+            <a:r>
+              <a:rPr lang="pt-BR" sz="1400" b="1" dirty="0">
+                <a:latin typeface="Roboto" panose="02000000000000000000" pitchFamily="2" charset="0"/>
+                <a:ea typeface="Roboto" panose="02000000000000000000" pitchFamily="2" charset="0"/>
+              </a:rPr>
+              <a:t>HEX: </a:t>
+            </a:r>
+            <a:r>
+              <a:rPr lang="pt-BR" sz="1400" dirty="0">
+                <a:latin typeface="Roboto" panose="02000000000000000000" pitchFamily="2" charset="0"/>
+                <a:ea typeface="Roboto" panose="02000000000000000000" pitchFamily="2" charset="0"/>
+              </a:rPr>
+              <a:t># </a:t>
+            </a:r>
+            <a:r>
+              <a:rPr lang="pt-BR" sz="1400" dirty="0"/>
+              <a:t>007C91</a:t>
+            </a:r>
+            <a:endParaRPr lang="pt-BR" sz="1400" dirty="0">
+              <a:latin typeface="Roboto" panose="02000000000000000000" pitchFamily="2" charset="0"/>
+              <a:ea typeface="Roboto" panose="02000000000000000000" pitchFamily="2" charset="0"/>
+            </a:endParaRPr>
+          </a:p>
+        </p:txBody>
+      </p:sp>
+      <p:sp>
+        <p:nvSpPr>
+          <p:cNvPr id="18" name="TextBox 17">
+            <a:extLst>
+              <a:ext uri="{FF2B5EF4-FFF2-40B4-BE49-F238E27FC236}">
+                <a16:creationId xmlns:a16="http://schemas.microsoft.com/office/drawing/2014/main" id="{41A9386D-7FAF-DEB0-74F3-7ED26D79FA68}"/>
+              </a:ext>
+            </a:extLst>
+          </p:cNvPr>
+          <p:cNvSpPr txBox="1"/>
+          <p:nvPr/>
+        </p:nvSpPr>
+        <p:spPr>
+          <a:xfrm>
+            <a:off x="6553873" y="5605790"/>
+            <a:ext cx="2482737" cy="523220"/>
+          </a:xfrm>
+          <a:prstGeom prst="rect">
+            <a:avLst/>
+          </a:prstGeom>
+          <a:noFill/>
+        </p:spPr>
+        <p:txBody>
+          <a:bodyPr wrap="square" rtlCol="0">
+            <a:spAutoFit/>
+          </a:bodyPr>
+          <a:lstStyle/>
+          <a:p>
+            <a:r>
+              <a:rPr lang="pt-BR" sz="1400" b="1" dirty="0">
+                <a:latin typeface="Roboto" panose="02000000000000000000" pitchFamily="2" charset="0"/>
+                <a:ea typeface="Roboto" panose="02000000000000000000" pitchFamily="2" charset="0"/>
+              </a:rPr>
+              <a:t>Color Name: </a:t>
+            </a:r>
+            <a:r>
+              <a:rPr lang="pt-BR" sz="1400" dirty="0">
+                <a:latin typeface="Roboto" panose="02000000000000000000" pitchFamily="2" charset="0"/>
+                <a:ea typeface="Roboto" panose="02000000000000000000" pitchFamily="2" charset="0"/>
+              </a:rPr>
+              <a:t>Permisimmon </a:t>
+            </a:r>
+          </a:p>
+          <a:p>
+            <a:r>
+              <a:rPr lang="pt-BR" sz="1400" b="1" dirty="0">
+                <a:latin typeface="Roboto" panose="02000000000000000000" pitchFamily="2" charset="0"/>
+                <a:ea typeface="Roboto" panose="02000000000000000000" pitchFamily="2" charset="0"/>
+              </a:rPr>
+              <a:t>HEX: </a:t>
+            </a:r>
+            <a:r>
+              <a:rPr lang="pt-BR" sz="1400" dirty="0">
+                <a:latin typeface="Roboto" panose="02000000000000000000" pitchFamily="2" charset="0"/>
+                <a:ea typeface="Roboto" panose="02000000000000000000" pitchFamily="2" charset="0"/>
+              </a:rPr>
+              <a:t># </a:t>
+            </a:r>
+            <a:r>
+              <a:rPr lang="pt-BR" sz="1400" dirty="0"/>
+              <a:t>E66100</a:t>
+            </a:r>
+            <a:endParaRPr lang="pt-BR" sz="1400" dirty="0">
+              <a:latin typeface="Roboto" panose="02000000000000000000" pitchFamily="2" charset="0"/>
+              <a:ea typeface="Roboto" panose="02000000000000000000" pitchFamily="2" charset="0"/>
+            </a:endParaRPr>
+          </a:p>
+        </p:txBody>
+      </p:sp>
+      <p:sp>
+        <p:nvSpPr>
+          <p:cNvPr id="19" name="TextBox 18">
+            <a:extLst>
+              <a:ext uri="{FF2B5EF4-FFF2-40B4-BE49-F238E27FC236}">
+                <a16:creationId xmlns:a16="http://schemas.microsoft.com/office/drawing/2014/main" id="{EE339E1B-A62D-0263-D851-B7E860348659}"/>
+              </a:ext>
+            </a:extLst>
+          </p:cNvPr>
+          <p:cNvSpPr txBox="1"/>
+          <p:nvPr/>
+        </p:nvSpPr>
+        <p:spPr>
+          <a:xfrm>
+            <a:off x="9295226" y="5605790"/>
+            <a:ext cx="2084225" cy="523220"/>
+          </a:xfrm>
+          <a:prstGeom prst="rect">
+            <a:avLst/>
+          </a:prstGeom>
+          <a:noFill/>
+        </p:spPr>
+        <p:txBody>
+          <a:bodyPr wrap="square" rtlCol="0">
+            <a:spAutoFit/>
+          </a:bodyPr>
+          <a:lstStyle/>
+          <a:p>
+            <a:r>
+              <a:rPr lang="pt-BR" sz="1400" b="1" dirty="0">
+                <a:latin typeface="Roboto" panose="02000000000000000000" pitchFamily="2" charset="0"/>
+                <a:ea typeface="Roboto" panose="02000000000000000000" pitchFamily="2" charset="0"/>
+              </a:rPr>
+              <a:t>Color Name: </a:t>
+            </a:r>
+            <a:r>
+              <a:rPr lang="pt-BR" sz="1400" dirty="0">
+                <a:latin typeface="Roboto" panose="02000000000000000000" pitchFamily="2" charset="0"/>
+                <a:ea typeface="Roboto" panose="02000000000000000000" pitchFamily="2" charset="0"/>
+              </a:rPr>
+              <a:t>Black </a:t>
+            </a:r>
+          </a:p>
+          <a:p>
+            <a:r>
+              <a:rPr lang="pt-BR" sz="1400" b="1" dirty="0">
+                <a:latin typeface="Roboto" panose="02000000000000000000" pitchFamily="2" charset="0"/>
+                <a:ea typeface="Roboto" panose="02000000000000000000" pitchFamily="2" charset="0"/>
+              </a:rPr>
+              <a:t>HEX: </a:t>
+            </a:r>
+            <a:r>
+              <a:rPr lang="pt-BR" sz="1400" dirty="0">
+                <a:latin typeface="Roboto" panose="02000000000000000000" pitchFamily="2" charset="0"/>
+                <a:ea typeface="Roboto" panose="02000000000000000000" pitchFamily="2" charset="0"/>
+              </a:rPr>
+              <a:t># 000000</a:t>
+            </a:r>
+          </a:p>
+        </p:txBody>
+      </p:sp>
+      <p:sp>
+        <p:nvSpPr>
+          <p:cNvPr id="21" name="TextBox 20">
+            <a:extLst>
+              <a:ext uri="{FF2B5EF4-FFF2-40B4-BE49-F238E27FC236}">
+                <a16:creationId xmlns:a16="http://schemas.microsoft.com/office/drawing/2014/main" id="{FCEDA319-8EDC-198B-29E3-0424798B6F5A}"/>
+              </a:ext>
+            </a:extLst>
+          </p:cNvPr>
+          <p:cNvSpPr txBox="1"/>
+          <p:nvPr/>
+        </p:nvSpPr>
+        <p:spPr>
+          <a:xfrm>
+            <a:off x="1196109" y="899862"/>
+            <a:ext cx="6105236" cy="369332"/>
+          </a:xfrm>
+          <a:prstGeom prst="rect">
+            <a:avLst/>
+          </a:prstGeom>
+          <a:noFill/>
+        </p:spPr>
+        <p:txBody>
+          <a:bodyPr wrap="square">
+            <a:spAutoFit/>
+          </a:bodyPr>
+          <a:lstStyle/>
+          <a:p>
+            <a:r>
+              <a:rPr lang="pt-BR" sz="1800" b="1" dirty="0">
+                <a:latin typeface="Roboto" panose="02000000000000000000" pitchFamily="2" charset="0"/>
+                <a:ea typeface="Roboto" panose="02000000000000000000" pitchFamily="2" charset="0"/>
+              </a:rPr>
+              <a:t>Regular</a:t>
+            </a:r>
+            <a:endParaRPr lang="pt-BR" dirty="0"/>
+          </a:p>
+        </p:txBody>
+      </p:sp>
+      <p:sp>
+        <p:nvSpPr>
+          <p:cNvPr id="22" name="TextBox 21">
+            <a:extLst>
+              <a:ext uri="{FF2B5EF4-FFF2-40B4-BE49-F238E27FC236}">
+                <a16:creationId xmlns:a16="http://schemas.microsoft.com/office/drawing/2014/main" id="{8269E53E-7BE2-77DA-850E-0079CC4F35CD}"/>
+              </a:ext>
+            </a:extLst>
+          </p:cNvPr>
+          <p:cNvSpPr txBox="1"/>
+          <p:nvPr/>
+        </p:nvSpPr>
+        <p:spPr>
+          <a:xfrm>
+            <a:off x="1196109" y="3638564"/>
+            <a:ext cx="6105236" cy="369332"/>
+          </a:xfrm>
+          <a:prstGeom prst="rect">
+            <a:avLst/>
+          </a:prstGeom>
+          <a:noFill/>
+        </p:spPr>
+        <p:txBody>
+          <a:bodyPr wrap="square">
+            <a:spAutoFit/>
+          </a:bodyPr>
+          <a:lstStyle/>
+          <a:p>
+            <a:r>
+              <a:rPr lang="pt-BR" sz="1800" b="1" dirty="0">
+                <a:latin typeface="Roboto" panose="02000000000000000000" pitchFamily="2" charset="0"/>
+                <a:ea typeface="Roboto" panose="02000000000000000000" pitchFamily="2" charset="0"/>
+              </a:rPr>
+              <a:t>Color blind-friendly</a:t>
+            </a:r>
+            <a:endParaRPr lang="pt-BR" dirty="0"/>
           </a:p>
         </p:txBody>
       </p:sp>
@@ -9295,7 +11928,7 @@
 </p:sld>
 </file>
 
-<file path=ppt/slides/slide4.xml><?xml version="1.0" encoding="utf-8"?>
+<file path=ppt/slides/slide5.xml><?xml version="1.0" encoding="utf-8"?>
 <p:sld xmlns:a="http://schemas.openxmlformats.org/drawingml/2006/main" xmlns:r="http://schemas.openxmlformats.org/officeDocument/2006/relationships" xmlns:p="http://schemas.openxmlformats.org/presentationml/2006/main">
   <p:cSld>
     <p:spTree>
@@ -9396,7 +12029,7 @@
 </p:sld>
 </file>
 
-<file path=ppt/slides/slide5.xml><?xml version="1.0" encoding="utf-8"?>
+<file path=ppt/slides/slide6.xml><?xml version="1.0" encoding="utf-8"?>
 <p:sld xmlns:a="http://schemas.openxmlformats.org/drawingml/2006/main" xmlns:r="http://schemas.openxmlformats.org/officeDocument/2006/relationships" xmlns:p="http://schemas.openxmlformats.org/presentationml/2006/main">
   <p:cSld>
     <p:spTree>
@@ -9462,7 +12095,7 @@
 </p:sld>
 </file>
 
-<file path=ppt/slides/slide6.xml><?xml version="1.0" encoding="utf-8"?>
+<file path=ppt/slides/slide7.xml><?xml version="1.0" encoding="utf-8"?>
 <p:sld xmlns:a="http://schemas.openxmlformats.org/drawingml/2006/main" xmlns:r="http://schemas.openxmlformats.org/officeDocument/2006/relationships" xmlns:p="http://schemas.openxmlformats.org/presentationml/2006/main">
   <p:cSld>
     <p:spTree>
@@ -10770,7 +13403,7 @@
 </p:sld>
 </file>
 
-<file path=ppt/slides/slide7.xml><?xml version="1.0" encoding="utf-8"?>
+<file path=ppt/slides/slide8.xml><?xml version="1.0" encoding="utf-8"?>
 <p:sld xmlns:a="http://schemas.openxmlformats.org/drawingml/2006/main" xmlns:r="http://schemas.openxmlformats.org/officeDocument/2006/relationships" xmlns:p="http://schemas.openxmlformats.org/presentationml/2006/main">
   <p:cSld>
     <p:spTree>
@@ -11986,7 +14619,7 @@
 </p:sld>
 </file>
 
-<file path=ppt/slides/slide8.xml><?xml version="1.0" encoding="utf-8"?>
+<file path=ppt/slides/slide9.xml><?xml version="1.0" encoding="utf-8"?>
 <p:sld xmlns:a="http://schemas.openxmlformats.org/drawingml/2006/main" xmlns:r="http://schemas.openxmlformats.org/officeDocument/2006/relationships" xmlns:p="http://schemas.openxmlformats.org/presentationml/2006/main">
   <p:cSld>
     <p:spTree>
@@ -13327,1273 +15960,6 @@
     <p:extLst>
       <p:ext uri="{BB962C8B-B14F-4D97-AF65-F5344CB8AC3E}">
         <p14:creationId xmlns:p14="http://schemas.microsoft.com/office/powerpoint/2010/main" val="1367122113"/>
-      </p:ext>
-    </p:extLst>
-  </p:cSld>
-  <p:clrMapOvr>
-    <a:masterClrMapping/>
-  </p:clrMapOvr>
-</p:sld>
-</file>
-
-<file path=ppt/slides/slide9.xml><?xml version="1.0" encoding="utf-8"?>
-<p:sld xmlns:a="http://schemas.openxmlformats.org/drawingml/2006/main" xmlns:r="http://schemas.openxmlformats.org/officeDocument/2006/relationships" xmlns:p="http://schemas.openxmlformats.org/presentationml/2006/main">
-  <p:cSld>
-    <p:spTree>
-      <p:nvGrpSpPr>
-        <p:cNvPr id="1" name="">
-          <a:extLst>
-            <a:ext uri="{FF2B5EF4-FFF2-40B4-BE49-F238E27FC236}">
-              <a16:creationId xmlns:a16="http://schemas.microsoft.com/office/drawing/2014/main" id="{86135AA5-CB4E-B8BE-5A68-4341B3B7D8E0}"/>
-            </a:ext>
-          </a:extLst>
-        </p:cNvPr>
-        <p:cNvGrpSpPr/>
-        <p:nvPr/>
-      </p:nvGrpSpPr>
-      <p:grpSpPr>
-        <a:xfrm>
-          <a:off x="0" y="0"/>
-          <a:ext cx="0" cy="0"/>
-          <a:chOff x="0" y="0"/>
-          <a:chExt cx="0" cy="0"/>
-        </a:xfrm>
-      </p:grpSpPr>
-      <p:sp>
-        <p:nvSpPr>
-          <p:cNvPr id="5" name="Right Triangle 4">
-            <a:extLst>
-              <a:ext uri="{FF2B5EF4-FFF2-40B4-BE49-F238E27FC236}">
-                <a16:creationId xmlns:a16="http://schemas.microsoft.com/office/drawing/2014/main" id="{D6E8A70F-18F7-7E41-5B47-F936A140C395}"/>
-              </a:ext>
-            </a:extLst>
-          </p:cNvPr>
-          <p:cNvSpPr/>
-          <p:nvPr/>
-        </p:nvSpPr>
-        <p:spPr>
-          <a:xfrm rot="16200000">
-            <a:off x="3731503" y="1310407"/>
-            <a:ext cx="2029693" cy="2004292"/>
-          </a:xfrm>
-          <a:prstGeom prst="rtTriangle">
-            <a:avLst/>
-          </a:prstGeom>
-          <a:solidFill>
-            <a:srgbClr val="075293"/>
-          </a:solidFill>
-          <a:ln>
-            <a:noFill/>
-          </a:ln>
-        </p:spPr>
-        <p:style>
-          <a:lnRef idx="2">
-            <a:schemeClr val="accent1">
-              <a:shade val="15000"/>
-            </a:schemeClr>
-          </a:lnRef>
-          <a:fillRef idx="1">
-            <a:schemeClr val="accent1"/>
-          </a:fillRef>
-          <a:effectRef idx="0">
-            <a:schemeClr val="accent1"/>
-          </a:effectRef>
-          <a:fontRef idx="minor">
-            <a:schemeClr val="lt1"/>
-          </a:fontRef>
-        </p:style>
-        <p:txBody>
-          <a:bodyPr rtlCol="0" anchor="ctr"/>
-          <a:lstStyle/>
-          <a:p>
-            <a:pPr algn="ctr"/>
-            <a:endParaRPr lang="pt-BR"/>
-          </a:p>
-        </p:txBody>
-      </p:sp>
-      <p:sp>
-        <p:nvSpPr>
-          <p:cNvPr id="6" name="Right Triangle 5">
-            <a:extLst>
-              <a:ext uri="{FF2B5EF4-FFF2-40B4-BE49-F238E27FC236}">
-                <a16:creationId xmlns:a16="http://schemas.microsoft.com/office/drawing/2014/main" id="{930B1128-E06A-59A0-565D-554A1343F5DA}"/>
-              </a:ext>
-            </a:extLst>
-          </p:cNvPr>
-          <p:cNvSpPr/>
-          <p:nvPr/>
-        </p:nvSpPr>
-        <p:spPr>
-          <a:xfrm>
-            <a:off x="6206837" y="1310407"/>
-            <a:ext cx="2029693" cy="2004292"/>
-          </a:xfrm>
-          <a:prstGeom prst="rtTriangle">
-            <a:avLst/>
-          </a:prstGeom>
-          <a:solidFill>
-            <a:srgbClr val="DF1E37"/>
-          </a:solidFill>
-          <a:ln>
-            <a:noFill/>
-          </a:ln>
-        </p:spPr>
-        <p:style>
-          <a:lnRef idx="2">
-            <a:schemeClr val="accent1">
-              <a:shade val="15000"/>
-            </a:schemeClr>
-          </a:lnRef>
-          <a:fillRef idx="1">
-            <a:schemeClr val="accent1"/>
-          </a:fillRef>
-          <a:effectRef idx="0">
-            <a:schemeClr val="accent1"/>
-          </a:effectRef>
-          <a:fontRef idx="minor">
-            <a:schemeClr val="lt1"/>
-          </a:fontRef>
-        </p:style>
-        <p:txBody>
-          <a:bodyPr rtlCol="0" anchor="ctr"/>
-          <a:lstStyle/>
-          <a:p>
-            <a:pPr algn="ctr"/>
-            <a:endParaRPr lang="pt-BR"/>
-          </a:p>
-        </p:txBody>
-      </p:sp>
-      <p:sp>
-        <p:nvSpPr>
-          <p:cNvPr id="7" name="Right Triangle 6">
-            <a:extLst>
-              <a:ext uri="{FF2B5EF4-FFF2-40B4-BE49-F238E27FC236}">
-                <a16:creationId xmlns:a16="http://schemas.microsoft.com/office/drawing/2014/main" id="{FE374D57-B886-D577-0EB6-8317060A19B3}"/>
-              </a:ext>
-            </a:extLst>
-          </p:cNvPr>
-          <p:cNvSpPr/>
-          <p:nvPr/>
-        </p:nvSpPr>
-        <p:spPr>
-          <a:xfrm rot="5400000">
-            <a:off x="6219537" y="3707243"/>
-            <a:ext cx="2029693" cy="2004292"/>
-          </a:xfrm>
-          <a:prstGeom prst="rtTriangle">
-            <a:avLst/>
-          </a:prstGeom>
-          <a:solidFill>
-            <a:schemeClr val="bg1">
-              <a:lumMod val="75000"/>
-            </a:schemeClr>
-          </a:solidFill>
-          <a:ln>
-            <a:noFill/>
-          </a:ln>
-        </p:spPr>
-        <p:style>
-          <a:lnRef idx="2">
-            <a:schemeClr val="accent1">
-              <a:shade val="15000"/>
-            </a:schemeClr>
-          </a:lnRef>
-          <a:fillRef idx="1">
-            <a:schemeClr val="accent1"/>
-          </a:fillRef>
-          <a:effectRef idx="0">
-            <a:schemeClr val="accent1"/>
-          </a:effectRef>
-          <a:fontRef idx="minor">
-            <a:schemeClr val="lt1"/>
-          </a:fontRef>
-        </p:style>
-        <p:txBody>
-          <a:bodyPr rtlCol="0" anchor="ctr"/>
-          <a:lstStyle/>
-          <a:p>
-            <a:pPr algn="ctr"/>
-            <a:endParaRPr lang="pt-BR"/>
-          </a:p>
-        </p:txBody>
-      </p:sp>
-      <p:sp>
-        <p:nvSpPr>
-          <p:cNvPr id="8" name="Right Triangle 7">
-            <a:extLst>
-              <a:ext uri="{FF2B5EF4-FFF2-40B4-BE49-F238E27FC236}">
-                <a16:creationId xmlns:a16="http://schemas.microsoft.com/office/drawing/2014/main" id="{62ACB4C3-5703-E06B-EAB1-279341C8BDA3}"/>
-              </a:ext>
-            </a:extLst>
-          </p:cNvPr>
-          <p:cNvSpPr/>
-          <p:nvPr/>
-        </p:nvSpPr>
-        <p:spPr>
-          <a:xfrm rot="10800000">
-            <a:off x="3744203" y="3707243"/>
-            <a:ext cx="2029693" cy="2004292"/>
-          </a:xfrm>
-          <a:prstGeom prst="rtTriangle">
-            <a:avLst/>
-          </a:prstGeom>
-          <a:solidFill>
-            <a:schemeClr val="tx1"/>
-          </a:solidFill>
-          <a:ln>
-            <a:noFill/>
-          </a:ln>
-        </p:spPr>
-        <p:style>
-          <a:lnRef idx="2">
-            <a:schemeClr val="accent1">
-              <a:shade val="15000"/>
-            </a:schemeClr>
-          </a:lnRef>
-          <a:fillRef idx="1">
-            <a:schemeClr val="accent1"/>
-          </a:fillRef>
-          <a:effectRef idx="0">
-            <a:schemeClr val="accent1"/>
-          </a:effectRef>
-          <a:fontRef idx="minor">
-            <a:schemeClr val="lt1"/>
-          </a:fontRef>
-        </p:style>
-        <p:txBody>
-          <a:bodyPr rtlCol="0" anchor="ctr"/>
-          <a:lstStyle/>
-          <a:p>
-            <a:pPr algn="ctr"/>
-            <a:endParaRPr lang="pt-BR"/>
-          </a:p>
-        </p:txBody>
-      </p:sp>
-      <p:sp>
-        <p:nvSpPr>
-          <p:cNvPr id="10" name="TextBox 9">
-            <a:extLst>
-              <a:ext uri="{FF2B5EF4-FFF2-40B4-BE49-F238E27FC236}">
-                <a16:creationId xmlns:a16="http://schemas.microsoft.com/office/drawing/2014/main" id="{E5D244E8-C342-F407-7408-1A65446E0460}"/>
-              </a:ext>
-            </a:extLst>
-          </p:cNvPr>
-          <p:cNvSpPr txBox="1"/>
-          <p:nvPr/>
-        </p:nvSpPr>
-        <p:spPr>
-          <a:xfrm>
-            <a:off x="4858328" y="2312553"/>
-            <a:ext cx="532518" cy="769441"/>
-          </a:xfrm>
-          <a:prstGeom prst="rect">
-            <a:avLst/>
-          </a:prstGeom>
-          <a:noFill/>
-        </p:spPr>
-        <p:txBody>
-          <a:bodyPr wrap="none" rtlCol="0">
-            <a:spAutoFit/>
-          </a:bodyPr>
-          <a:lstStyle/>
-          <a:p>
-            <a:r>
-              <a:rPr lang="pt-BR" sz="4400" b="1" dirty="0">
-                <a:solidFill>
-                  <a:schemeClr val="bg1"/>
-                </a:solidFill>
-                <a:latin typeface="Roboto" panose="02000000000000000000" pitchFamily="2" charset="0"/>
-                <a:ea typeface="Roboto" panose="02000000000000000000" pitchFamily="2" charset="0"/>
-              </a:rPr>
-              <a:t>S</a:t>
-            </a:r>
-          </a:p>
-        </p:txBody>
-      </p:sp>
-      <p:sp>
-        <p:nvSpPr>
-          <p:cNvPr id="11" name="TextBox 10">
-            <a:extLst>
-              <a:ext uri="{FF2B5EF4-FFF2-40B4-BE49-F238E27FC236}">
-                <a16:creationId xmlns:a16="http://schemas.microsoft.com/office/drawing/2014/main" id="{D13C3C0F-6E19-911B-3896-1D68977DBBA1}"/>
-              </a:ext>
-            </a:extLst>
-          </p:cNvPr>
-          <p:cNvSpPr txBox="1"/>
-          <p:nvPr/>
-        </p:nvSpPr>
-        <p:spPr>
-          <a:xfrm>
-            <a:off x="6504971" y="2312552"/>
-            <a:ext cx="599844" cy="769441"/>
-          </a:xfrm>
-          <a:prstGeom prst="rect">
-            <a:avLst/>
-          </a:prstGeom>
-          <a:noFill/>
-        </p:spPr>
-        <p:txBody>
-          <a:bodyPr wrap="none" rtlCol="0">
-            <a:spAutoFit/>
-          </a:bodyPr>
-          <a:lstStyle/>
-          <a:p>
-            <a:r>
-              <a:rPr lang="pt-BR" sz="4400" b="1" dirty="0">
-                <a:solidFill>
-                  <a:schemeClr val="bg1"/>
-                </a:solidFill>
-                <a:latin typeface="Roboto" panose="02000000000000000000" pitchFamily="2" charset="0"/>
-                <a:ea typeface="Roboto" panose="02000000000000000000" pitchFamily="2" charset="0"/>
-              </a:rPr>
-              <a:t>w</a:t>
-            </a:r>
-          </a:p>
-        </p:txBody>
-      </p:sp>
-      <p:sp>
-        <p:nvSpPr>
-          <p:cNvPr id="12" name="TextBox 11">
-            <a:extLst>
-              <a:ext uri="{FF2B5EF4-FFF2-40B4-BE49-F238E27FC236}">
-                <a16:creationId xmlns:a16="http://schemas.microsoft.com/office/drawing/2014/main" id="{47B6A405-19C6-5342-D237-A2821080F0E0}"/>
-              </a:ext>
-            </a:extLst>
-          </p:cNvPr>
-          <p:cNvSpPr txBox="1"/>
-          <p:nvPr/>
-        </p:nvSpPr>
-        <p:spPr>
-          <a:xfrm>
-            <a:off x="4918820" y="3957527"/>
-            <a:ext cx="534121" cy="769441"/>
-          </a:xfrm>
-          <a:prstGeom prst="rect">
-            <a:avLst/>
-          </a:prstGeom>
-          <a:noFill/>
-        </p:spPr>
-        <p:txBody>
-          <a:bodyPr wrap="none" rtlCol="0">
-            <a:spAutoFit/>
-          </a:bodyPr>
-          <a:lstStyle/>
-          <a:p>
-            <a:r>
-              <a:rPr lang="pt-BR" sz="4400" b="1" dirty="0">
-                <a:solidFill>
-                  <a:schemeClr val="bg1"/>
-                </a:solidFill>
-                <a:latin typeface="Roboto" panose="02000000000000000000" pitchFamily="2" charset="0"/>
-                <a:ea typeface="Roboto" panose="02000000000000000000" pitchFamily="2" charset="0"/>
-              </a:rPr>
-              <a:t>T</a:t>
-            </a:r>
-          </a:p>
-        </p:txBody>
-      </p:sp>
-      <p:sp>
-        <p:nvSpPr>
-          <p:cNvPr id="13" name="TextBox 12">
-            <a:extLst>
-              <a:ext uri="{FF2B5EF4-FFF2-40B4-BE49-F238E27FC236}">
-                <a16:creationId xmlns:a16="http://schemas.microsoft.com/office/drawing/2014/main" id="{770DDF39-DF0E-5863-0975-BA2BD2DA6709}"/>
-              </a:ext>
-            </a:extLst>
-          </p:cNvPr>
-          <p:cNvSpPr txBox="1"/>
-          <p:nvPr/>
-        </p:nvSpPr>
-        <p:spPr>
-          <a:xfrm>
-            <a:off x="6565463" y="3957526"/>
-            <a:ext cx="574196" cy="769441"/>
-          </a:xfrm>
-          <a:prstGeom prst="rect">
-            <a:avLst/>
-          </a:prstGeom>
-          <a:noFill/>
-        </p:spPr>
-        <p:txBody>
-          <a:bodyPr wrap="none" rtlCol="0">
-            <a:spAutoFit/>
-          </a:bodyPr>
-          <a:lstStyle/>
-          <a:p>
-            <a:r>
-              <a:rPr lang="pt-BR" sz="4400" b="1" dirty="0">
-                <a:solidFill>
-                  <a:schemeClr val="bg1"/>
-                </a:solidFill>
-                <a:latin typeface="Roboto" panose="02000000000000000000" pitchFamily="2" charset="0"/>
-                <a:ea typeface="Roboto" panose="02000000000000000000" pitchFamily="2" charset="0"/>
-              </a:rPr>
-              <a:t>O</a:t>
-            </a:r>
-          </a:p>
-        </p:txBody>
-      </p:sp>
-      <p:sp>
-        <p:nvSpPr>
-          <p:cNvPr id="14" name="Oval 13">
-            <a:extLst>
-              <a:ext uri="{FF2B5EF4-FFF2-40B4-BE49-F238E27FC236}">
-                <a16:creationId xmlns:a16="http://schemas.microsoft.com/office/drawing/2014/main" id="{ACEC257B-70FF-BF6C-25C9-9A7691578F0D}"/>
-              </a:ext>
-            </a:extLst>
-          </p:cNvPr>
-          <p:cNvSpPr/>
-          <p:nvPr/>
-        </p:nvSpPr>
-        <p:spPr>
-          <a:xfrm>
-            <a:off x="235966" y="248226"/>
-            <a:ext cx="720000" cy="720000"/>
-          </a:xfrm>
-          <a:prstGeom prst="ellipse">
-            <a:avLst/>
-          </a:prstGeom>
-          <a:solidFill>
-            <a:srgbClr val="075293"/>
-          </a:solidFill>
-          <a:ln>
-            <a:noFill/>
-          </a:ln>
-        </p:spPr>
-        <p:style>
-          <a:lnRef idx="2">
-            <a:schemeClr val="accent1">
-              <a:shade val="15000"/>
-            </a:schemeClr>
-          </a:lnRef>
-          <a:fillRef idx="1">
-            <a:schemeClr val="accent1"/>
-          </a:fillRef>
-          <a:effectRef idx="0">
-            <a:schemeClr val="accent1"/>
-          </a:effectRef>
-          <a:fontRef idx="minor">
-            <a:schemeClr val="lt1"/>
-          </a:fontRef>
-        </p:style>
-        <p:txBody>
-          <a:bodyPr rtlCol="0" anchor="ctr"/>
-          <a:lstStyle/>
-          <a:p>
-            <a:pPr algn="ctr"/>
-            <a:endParaRPr lang="pt-BR"/>
-          </a:p>
-        </p:txBody>
-      </p:sp>
-      <p:sp>
-        <p:nvSpPr>
-          <p:cNvPr id="15" name="Oval 14">
-            <a:extLst>
-              <a:ext uri="{FF2B5EF4-FFF2-40B4-BE49-F238E27FC236}">
-                <a16:creationId xmlns:a16="http://schemas.microsoft.com/office/drawing/2014/main" id="{C9E96107-3064-0949-D1A1-553C0F9846D6}"/>
-              </a:ext>
-            </a:extLst>
-          </p:cNvPr>
-          <p:cNvSpPr/>
-          <p:nvPr/>
-        </p:nvSpPr>
-        <p:spPr>
-          <a:xfrm>
-            <a:off x="11282216" y="248226"/>
-            <a:ext cx="720000" cy="720000"/>
-          </a:xfrm>
-          <a:prstGeom prst="ellipse">
-            <a:avLst/>
-          </a:prstGeom>
-          <a:solidFill>
-            <a:srgbClr val="DF1E37"/>
-          </a:solidFill>
-          <a:ln>
-            <a:noFill/>
-          </a:ln>
-        </p:spPr>
-        <p:style>
-          <a:lnRef idx="2">
-            <a:schemeClr val="accent1">
-              <a:shade val="15000"/>
-            </a:schemeClr>
-          </a:lnRef>
-          <a:fillRef idx="1">
-            <a:schemeClr val="accent1"/>
-          </a:fillRef>
-          <a:effectRef idx="0">
-            <a:schemeClr val="accent1"/>
-          </a:effectRef>
-          <a:fontRef idx="minor">
-            <a:schemeClr val="lt1"/>
-          </a:fontRef>
-        </p:style>
-        <p:txBody>
-          <a:bodyPr rtlCol="0" anchor="ctr"/>
-          <a:lstStyle/>
-          <a:p>
-            <a:pPr algn="ctr"/>
-            <a:endParaRPr lang="pt-BR"/>
-          </a:p>
-        </p:txBody>
-      </p:sp>
-      <p:sp>
-        <p:nvSpPr>
-          <p:cNvPr id="16" name="Oval 15">
-            <a:extLst>
-              <a:ext uri="{FF2B5EF4-FFF2-40B4-BE49-F238E27FC236}">
-                <a16:creationId xmlns:a16="http://schemas.microsoft.com/office/drawing/2014/main" id="{27BC21C0-4D37-6E62-DFEC-87552D47471C}"/>
-              </a:ext>
-            </a:extLst>
-          </p:cNvPr>
-          <p:cNvSpPr/>
-          <p:nvPr/>
-        </p:nvSpPr>
-        <p:spPr>
-          <a:xfrm>
-            <a:off x="11282216" y="5832982"/>
-            <a:ext cx="720000" cy="720000"/>
-          </a:xfrm>
-          <a:prstGeom prst="ellipse">
-            <a:avLst/>
-          </a:prstGeom>
-          <a:solidFill>
-            <a:schemeClr val="bg1">
-              <a:lumMod val="75000"/>
-            </a:schemeClr>
-          </a:solidFill>
-          <a:ln>
-            <a:noFill/>
-          </a:ln>
-        </p:spPr>
-        <p:style>
-          <a:lnRef idx="2">
-            <a:schemeClr val="accent1">
-              <a:shade val="15000"/>
-            </a:schemeClr>
-          </a:lnRef>
-          <a:fillRef idx="1">
-            <a:schemeClr val="accent1"/>
-          </a:fillRef>
-          <a:effectRef idx="0">
-            <a:schemeClr val="accent1"/>
-          </a:effectRef>
-          <a:fontRef idx="minor">
-            <a:schemeClr val="lt1"/>
-          </a:fontRef>
-        </p:style>
-        <p:txBody>
-          <a:bodyPr rtlCol="0" anchor="ctr"/>
-          <a:lstStyle/>
-          <a:p>
-            <a:pPr algn="ctr"/>
-            <a:endParaRPr lang="pt-BR"/>
-          </a:p>
-        </p:txBody>
-      </p:sp>
-      <p:sp>
-        <p:nvSpPr>
-          <p:cNvPr id="17" name="Oval 16">
-            <a:extLst>
-              <a:ext uri="{FF2B5EF4-FFF2-40B4-BE49-F238E27FC236}">
-                <a16:creationId xmlns:a16="http://schemas.microsoft.com/office/drawing/2014/main" id="{864CFF2E-C543-3AEC-B18F-139444B62330}"/>
-              </a:ext>
-            </a:extLst>
-          </p:cNvPr>
-          <p:cNvSpPr/>
-          <p:nvPr/>
-        </p:nvSpPr>
-        <p:spPr>
-          <a:xfrm>
-            <a:off x="235966" y="5894392"/>
-            <a:ext cx="720000" cy="720000"/>
-          </a:xfrm>
-          <a:prstGeom prst="ellipse">
-            <a:avLst/>
-          </a:prstGeom>
-          <a:solidFill>
-            <a:schemeClr val="tx1"/>
-          </a:solidFill>
-          <a:ln>
-            <a:noFill/>
-          </a:ln>
-        </p:spPr>
-        <p:style>
-          <a:lnRef idx="2">
-            <a:schemeClr val="accent1">
-              <a:shade val="15000"/>
-            </a:schemeClr>
-          </a:lnRef>
-          <a:fillRef idx="1">
-            <a:schemeClr val="accent1"/>
-          </a:fillRef>
-          <a:effectRef idx="0">
-            <a:schemeClr val="accent1"/>
-          </a:effectRef>
-          <a:fontRef idx="minor">
-            <a:schemeClr val="lt1"/>
-          </a:fontRef>
-        </p:style>
-        <p:txBody>
-          <a:bodyPr rtlCol="0" anchor="ctr"/>
-          <a:lstStyle/>
-          <a:p>
-            <a:pPr algn="ctr"/>
-            <a:endParaRPr lang="pt-BR"/>
-          </a:p>
-        </p:txBody>
-      </p:sp>
-      <p:pic>
-        <p:nvPicPr>
-          <p:cNvPr id="19" name="Graphic 18" descr="Muscular arm with solid fill">
-            <a:extLst>
-              <a:ext uri="{FF2B5EF4-FFF2-40B4-BE49-F238E27FC236}">
-                <a16:creationId xmlns:a16="http://schemas.microsoft.com/office/drawing/2014/main" id="{4BAA1300-DDB1-E5B0-B5E5-0180FB51C3B4}"/>
-              </a:ext>
-            </a:extLst>
-          </p:cNvPr>
-          <p:cNvPicPr>
-            <a:picLocks noChangeAspect="1"/>
-          </p:cNvPicPr>
-          <p:nvPr/>
-        </p:nvPicPr>
-        <p:blipFill>
-          <a:blip r:embed="rId2">
-            <a:extLst>
-              <a:ext uri="{96DAC541-7B7A-43D3-8B79-37D633B846F1}">
-                <asvg:svgBlip xmlns:asvg="http://schemas.microsoft.com/office/drawing/2016/SVG/main" r:embed="rId3"/>
-              </a:ext>
-            </a:extLst>
-          </a:blip>
-          <a:stretch>
-            <a:fillRect/>
-          </a:stretch>
-        </p:blipFill>
-        <p:spPr>
-          <a:xfrm>
-            <a:off x="367366" y="379626"/>
-            <a:ext cx="457200" cy="457200"/>
-          </a:xfrm>
-          <a:prstGeom prst="rect">
-            <a:avLst/>
-          </a:prstGeom>
-        </p:spPr>
-      </p:pic>
-      <p:pic>
-        <p:nvPicPr>
-          <p:cNvPr id="21" name="Graphic 20" descr="Handshake with solid fill">
-            <a:extLst>
-              <a:ext uri="{FF2B5EF4-FFF2-40B4-BE49-F238E27FC236}">
-                <a16:creationId xmlns:a16="http://schemas.microsoft.com/office/drawing/2014/main" id="{09A4D7D7-0CF9-4A35-7652-17BBC4EE5659}"/>
-              </a:ext>
-            </a:extLst>
-          </p:cNvPr>
-          <p:cNvPicPr>
-            <a:picLocks noChangeAspect="1"/>
-          </p:cNvPicPr>
-          <p:nvPr/>
-        </p:nvPicPr>
-        <p:blipFill>
-          <a:blip r:embed="rId4">
-            <a:extLst>
-              <a:ext uri="{96DAC541-7B7A-43D3-8B79-37D633B846F1}">
-                <asvg:svgBlip xmlns:asvg="http://schemas.microsoft.com/office/drawing/2016/SVG/main" r:embed="rId5"/>
-              </a:ext>
-            </a:extLst>
-          </a:blip>
-          <a:stretch>
-            <a:fillRect/>
-          </a:stretch>
-        </p:blipFill>
-        <p:spPr>
-          <a:xfrm>
-            <a:off x="11472013" y="6031436"/>
-            <a:ext cx="360035" cy="360035"/>
-          </a:xfrm>
-          <a:prstGeom prst="rect">
-            <a:avLst/>
-          </a:prstGeom>
-        </p:spPr>
-      </p:pic>
-      <p:pic>
-        <p:nvPicPr>
-          <p:cNvPr id="23" name="Graphic 22" descr="Fire with solid fill">
-            <a:extLst>
-              <a:ext uri="{FF2B5EF4-FFF2-40B4-BE49-F238E27FC236}">
-                <a16:creationId xmlns:a16="http://schemas.microsoft.com/office/drawing/2014/main" id="{048F9A98-5E32-C5CF-5E70-6DC7B7C50D7B}"/>
-              </a:ext>
-            </a:extLst>
-          </p:cNvPr>
-          <p:cNvPicPr>
-            <a:picLocks noChangeAspect="1"/>
-          </p:cNvPicPr>
-          <p:nvPr/>
-        </p:nvPicPr>
-        <p:blipFill>
-          <a:blip r:embed="rId6">
-            <a:extLst>
-              <a:ext uri="{96DAC541-7B7A-43D3-8B79-37D633B846F1}">
-                <asvg:svgBlip xmlns:asvg="http://schemas.microsoft.com/office/drawing/2016/SVG/main" r:embed="rId7"/>
-              </a:ext>
-            </a:extLst>
-          </a:blip>
-          <a:stretch>
-            <a:fillRect/>
-          </a:stretch>
-        </p:blipFill>
-        <p:spPr>
-          <a:xfrm>
-            <a:off x="424606" y="6083032"/>
-            <a:ext cx="342720" cy="342720"/>
-          </a:xfrm>
-          <a:prstGeom prst="rect">
-            <a:avLst/>
-          </a:prstGeom>
-        </p:spPr>
-      </p:pic>
-      <p:pic>
-        <p:nvPicPr>
-          <p:cNvPr id="25" name="Graphic 24" descr="Empty battery with solid fill">
-            <a:extLst>
-              <a:ext uri="{FF2B5EF4-FFF2-40B4-BE49-F238E27FC236}">
-                <a16:creationId xmlns:a16="http://schemas.microsoft.com/office/drawing/2014/main" id="{BAE75AB4-12B6-DB22-5145-09A84883DE19}"/>
-              </a:ext>
-            </a:extLst>
-          </p:cNvPr>
-          <p:cNvPicPr>
-            <a:picLocks noChangeAspect="1"/>
-          </p:cNvPicPr>
-          <p:nvPr/>
-        </p:nvPicPr>
-        <p:blipFill>
-          <a:blip r:embed="rId8">
-            <a:extLst>
-              <a:ext uri="{96DAC541-7B7A-43D3-8B79-37D633B846F1}">
-                <asvg:svgBlip xmlns:asvg="http://schemas.microsoft.com/office/drawing/2016/SVG/main" r:embed="rId9"/>
-              </a:ext>
-            </a:extLst>
-          </a:blip>
-          <a:stretch>
-            <a:fillRect/>
-          </a:stretch>
-        </p:blipFill>
-        <p:spPr>
-          <a:xfrm>
-            <a:off x="11499051" y="462751"/>
-            <a:ext cx="315413" cy="315413"/>
-          </a:xfrm>
-          <a:prstGeom prst="rect">
-            <a:avLst/>
-          </a:prstGeom>
-        </p:spPr>
-      </p:pic>
-      <p:cxnSp>
-        <p:nvCxnSpPr>
-          <p:cNvPr id="27" name="Straight Connector 26">
-            <a:extLst>
-              <a:ext uri="{FF2B5EF4-FFF2-40B4-BE49-F238E27FC236}">
-                <a16:creationId xmlns:a16="http://schemas.microsoft.com/office/drawing/2014/main" id="{DDBAF66F-2631-1E5E-A230-FC48CC09B79D}"/>
-              </a:ext>
-            </a:extLst>
-          </p:cNvPr>
-          <p:cNvCxnSpPr/>
-          <p:nvPr/>
-        </p:nvCxnSpPr>
-        <p:spPr>
-          <a:xfrm>
-            <a:off x="0" y="3493652"/>
-            <a:ext cx="12192000" cy="0"/>
-          </a:xfrm>
-          <a:prstGeom prst="line">
-            <a:avLst/>
-          </a:prstGeom>
-          <a:ln w="9525">
-            <a:solidFill>
-              <a:srgbClr val="E2E2E2"/>
-            </a:solidFill>
-            <a:prstDash val="solid"/>
-          </a:ln>
-        </p:spPr>
-        <p:style>
-          <a:lnRef idx="2">
-            <a:schemeClr val="accent1"/>
-          </a:lnRef>
-          <a:fillRef idx="0">
-            <a:schemeClr val="accent1"/>
-          </a:fillRef>
-          <a:effectRef idx="1">
-            <a:schemeClr val="accent1"/>
-          </a:effectRef>
-          <a:fontRef idx="minor">
-            <a:schemeClr val="tx1"/>
-          </a:fontRef>
-        </p:style>
-      </p:cxnSp>
-      <p:cxnSp>
-        <p:nvCxnSpPr>
-          <p:cNvPr id="29" name="Straight Connector 28">
-            <a:extLst>
-              <a:ext uri="{FF2B5EF4-FFF2-40B4-BE49-F238E27FC236}">
-                <a16:creationId xmlns:a16="http://schemas.microsoft.com/office/drawing/2014/main" id="{168E5DCA-68A5-2A60-E5B7-9FFE822488E8}"/>
-              </a:ext>
-            </a:extLst>
-          </p:cNvPr>
-          <p:cNvCxnSpPr>
-            <a:cxnSpLocks/>
-          </p:cNvCxnSpPr>
-          <p:nvPr/>
-        </p:nvCxnSpPr>
-        <p:spPr>
-          <a:xfrm flipH="1" flipV="1">
-            <a:off x="5994400" y="64655"/>
-            <a:ext cx="0" cy="6793345"/>
-          </a:xfrm>
-          <a:prstGeom prst="line">
-            <a:avLst/>
-          </a:prstGeom>
-          <a:ln w="9525">
-            <a:solidFill>
-              <a:srgbClr val="E2E2E2"/>
-            </a:solidFill>
-            <a:prstDash val="solid"/>
-          </a:ln>
-        </p:spPr>
-        <p:style>
-          <a:lnRef idx="2">
-            <a:schemeClr val="accent1"/>
-          </a:lnRef>
-          <a:fillRef idx="0">
-            <a:schemeClr val="accent1"/>
-          </a:fillRef>
-          <a:effectRef idx="1">
-            <a:schemeClr val="accent1"/>
-          </a:effectRef>
-          <a:fontRef idx="minor">
-            <a:schemeClr val="tx1"/>
-          </a:fontRef>
-        </p:style>
-      </p:cxnSp>
-      <p:sp>
-        <p:nvSpPr>
-          <p:cNvPr id="32" name="TextBox 31">
-            <a:extLst>
-              <a:ext uri="{FF2B5EF4-FFF2-40B4-BE49-F238E27FC236}">
-                <a16:creationId xmlns:a16="http://schemas.microsoft.com/office/drawing/2014/main" id="{3C120B74-3D9F-00EC-D4B7-93E91AE92102}"/>
-              </a:ext>
-            </a:extLst>
-          </p:cNvPr>
-          <p:cNvSpPr txBox="1"/>
-          <p:nvPr/>
-        </p:nvSpPr>
-        <p:spPr>
-          <a:xfrm>
-            <a:off x="1070470" y="498272"/>
-            <a:ext cx="1346844" cy="338554"/>
-          </a:xfrm>
-          <a:prstGeom prst="rect">
-            <a:avLst/>
-          </a:prstGeom>
-          <a:noFill/>
-        </p:spPr>
-        <p:txBody>
-          <a:bodyPr wrap="none" rtlCol="0">
-            <a:spAutoFit/>
-          </a:bodyPr>
-          <a:lstStyle/>
-          <a:p>
-            <a:r>
-              <a:rPr lang="pt-BR" sz="1600" dirty="0">
-                <a:latin typeface="Roboto" panose="02000000000000000000" pitchFamily="2" charset="0"/>
-                <a:ea typeface="Roboto" panose="02000000000000000000" pitchFamily="2" charset="0"/>
-              </a:rPr>
-              <a:t>STRENGHTS</a:t>
-            </a:r>
-          </a:p>
-        </p:txBody>
-      </p:sp>
-      <p:sp>
-        <p:nvSpPr>
-          <p:cNvPr id="33" name="TextBox 32">
-            <a:extLst>
-              <a:ext uri="{FF2B5EF4-FFF2-40B4-BE49-F238E27FC236}">
-                <a16:creationId xmlns:a16="http://schemas.microsoft.com/office/drawing/2014/main" id="{56210124-9A4C-E8EA-3CEE-3436035E0E0D}"/>
-              </a:ext>
-            </a:extLst>
-          </p:cNvPr>
-          <p:cNvSpPr txBox="1"/>
-          <p:nvPr/>
-        </p:nvSpPr>
-        <p:spPr>
-          <a:xfrm>
-            <a:off x="9671669" y="485353"/>
-            <a:ext cx="1491114" cy="338554"/>
-          </a:xfrm>
-          <a:prstGeom prst="rect">
-            <a:avLst/>
-          </a:prstGeom>
-          <a:noFill/>
-        </p:spPr>
-        <p:txBody>
-          <a:bodyPr wrap="none" rtlCol="0">
-            <a:spAutoFit/>
-          </a:bodyPr>
-          <a:lstStyle/>
-          <a:p>
-            <a:r>
-              <a:rPr lang="pt-BR" sz="1600" dirty="0">
-                <a:latin typeface="Roboto" panose="02000000000000000000" pitchFamily="2" charset="0"/>
-                <a:ea typeface="Roboto" panose="02000000000000000000" pitchFamily="2" charset="0"/>
-              </a:rPr>
-              <a:t>WEAKNESSES</a:t>
-            </a:r>
-          </a:p>
-        </p:txBody>
-      </p:sp>
-      <p:sp>
-        <p:nvSpPr>
-          <p:cNvPr id="34" name="TextBox 33">
-            <a:extLst>
-              <a:ext uri="{FF2B5EF4-FFF2-40B4-BE49-F238E27FC236}">
-                <a16:creationId xmlns:a16="http://schemas.microsoft.com/office/drawing/2014/main" id="{CFEE02D5-0E59-4750-3F40-0D137B68B42D}"/>
-              </a:ext>
-            </a:extLst>
-          </p:cNvPr>
-          <p:cNvSpPr txBox="1"/>
-          <p:nvPr/>
-        </p:nvSpPr>
-        <p:spPr>
-          <a:xfrm>
-            <a:off x="9497168" y="6080275"/>
-            <a:ext cx="1726755" cy="338554"/>
-          </a:xfrm>
-          <a:prstGeom prst="rect">
-            <a:avLst/>
-          </a:prstGeom>
-          <a:noFill/>
-        </p:spPr>
-        <p:txBody>
-          <a:bodyPr wrap="none" rtlCol="0">
-            <a:spAutoFit/>
-          </a:bodyPr>
-          <a:lstStyle/>
-          <a:p>
-            <a:r>
-              <a:rPr lang="pt-BR" sz="1600" dirty="0">
-                <a:latin typeface="Roboto" panose="02000000000000000000" pitchFamily="2" charset="0"/>
-                <a:ea typeface="Roboto" panose="02000000000000000000" pitchFamily="2" charset="0"/>
-              </a:rPr>
-              <a:t>OPPORTUNITIES</a:t>
-            </a:r>
-          </a:p>
-        </p:txBody>
-      </p:sp>
-      <p:sp>
-        <p:nvSpPr>
-          <p:cNvPr id="35" name="TextBox 34">
-            <a:extLst>
-              <a:ext uri="{FF2B5EF4-FFF2-40B4-BE49-F238E27FC236}">
-                <a16:creationId xmlns:a16="http://schemas.microsoft.com/office/drawing/2014/main" id="{233E4487-CFB7-A644-20EC-EF67F05C10E9}"/>
-              </a:ext>
-            </a:extLst>
-          </p:cNvPr>
-          <p:cNvSpPr txBox="1"/>
-          <p:nvPr/>
-        </p:nvSpPr>
-        <p:spPr>
-          <a:xfrm>
-            <a:off x="1050864" y="6087432"/>
-            <a:ext cx="1072730" cy="338554"/>
-          </a:xfrm>
-          <a:prstGeom prst="rect">
-            <a:avLst/>
-          </a:prstGeom>
-          <a:noFill/>
-        </p:spPr>
-        <p:txBody>
-          <a:bodyPr wrap="none" rtlCol="0">
-            <a:spAutoFit/>
-          </a:bodyPr>
-          <a:lstStyle/>
-          <a:p>
-            <a:r>
-              <a:rPr lang="pt-BR" sz="1600" dirty="0">
-                <a:latin typeface="Roboto" panose="02000000000000000000" pitchFamily="2" charset="0"/>
-                <a:ea typeface="Roboto" panose="02000000000000000000" pitchFamily="2" charset="0"/>
-              </a:rPr>
-              <a:t>THREATS</a:t>
-            </a:r>
-          </a:p>
-        </p:txBody>
-      </p:sp>
-      <p:sp>
-        <p:nvSpPr>
-          <p:cNvPr id="2" name="TextBox 1">
-            <a:extLst>
-              <a:ext uri="{FF2B5EF4-FFF2-40B4-BE49-F238E27FC236}">
-                <a16:creationId xmlns:a16="http://schemas.microsoft.com/office/drawing/2014/main" id="{8EBBA98D-D53B-2015-3461-9A791BB2ACA1}"/>
-              </a:ext>
-            </a:extLst>
-          </p:cNvPr>
-          <p:cNvSpPr txBox="1"/>
-          <p:nvPr/>
-        </p:nvSpPr>
-        <p:spPr>
-          <a:xfrm>
-            <a:off x="284629" y="1119773"/>
-            <a:ext cx="3954112" cy="830997"/>
-          </a:xfrm>
-          <a:prstGeom prst="rect">
-            <a:avLst/>
-          </a:prstGeom>
-          <a:noFill/>
-        </p:spPr>
-        <p:txBody>
-          <a:bodyPr wrap="square" rtlCol="0">
-            <a:spAutoFit/>
-          </a:bodyPr>
-          <a:lstStyle/>
-          <a:p>
-            <a:pPr marL="171450" indent="-171450">
-              <a:buFont typeface="Arial" panose="020B0604020202020204" pitchFamily="34" charset="0"/>
-              <a:buChar char="•"/>
-            </a:pPr>
-            <a:r>
-              <a:rPr lang="pt-BR" sz="1200" dirty="0">
-                <a:latin typeface="Roboto" panose="02000000000000000000" pitchFamily="2" charset="0"/>
-                <a:ea typeface="Roboto" panose="02000000000000000000" pitchFamily="2" charset="0"/>
-              </a:rPr>
-              <a:t>Clear visual structure</a:t>
-            </a:r>
-          </a:p>
-          <a:p>
-            <a:pPr marL="171450" indent="-171450">
-              <a:buFont typeface="Arial" panose="020B0604020202020204" pitchFamily="34" charset="0"/>
-              <a:buChar char="•"/>
-            </a:pPr>
-            <a:r>
-              <a:rPr lang="pt-BR" sz="1200" dirty="0">
-                <a:latin typeface="Roboto" panose="02000000000000000000" pitchFamily="2" charset="0"/>
-                <a:ea typeface="Roboto" panose="02000000000000000000" pitchFamily="2" charset="0"/>
-              </a:rPr>
-              <a:t>Easy interaction infraestructure and good readability</a:t>
-            </a:r>
-          </a:p>
-          <a:p>
-            <a:pPr marL="171450" indent="-171450">
-              <a:buFont typeface="Arial" panose="020B0604020202020204" pitchFamily="34" charset="0"/>
-              <a:buChar char="•"/>
-            </a:pPr>
-            <a:r>
-              <a:rPr lang="pt-BR" sz="1200" dirty="0">
-                <a:latin typeface="Roboto" panose="02000000000000000000" pitchFamily="2" charset="0"/>
-                <a:ea typeface="Roboto" panose="02000000000000000000" pitchFamily="2" charset="0"/>
-              </a:rPr>
-              <a:t>Good styling </a:t>
-            </a:r>
-          </a:p>
-          <a:p>
-            <a:endParaRPr lang="pt-BR" sz="1200" dirty="0">
-              <a:latin typeface="Roboto" panose="02000000000000000000" pitchFamily="2" charset="0"/>
-              <a:ea typeface="Roboto" panose="02000000000000000000" pitchFamily="2" charset="0"/>
-            </a:endParaRPr>
-          </a:p>
-        </p:txBody>
-      </p:sp>
-      <p:sp>
-        <p:nvSpPr>
-          <p:cNvPr id="3" name="TextBox 2">
-            <a:extLst>
-              <a:ext uri="{FF2B5EF4-FFF2-40B4-BE49-F238E27FC236}">
-                <a16:creationId xmlns:a16="http://schemas.microsoft.com/office/drawing/2014/main" id="{F8ADCD5B-63E9-4EAB-72A0-F52488042FDC}"/>
-              </a:ext>
-            </a:extLst>
-          </p:cNvPr>
-          <p:cNvSpPr txBox="1"/>
-          <p:nvPr/>
-        </p:nvSpPr>
-        <p:spPr>
-          <a:xfrm>
-            <a:off x="8383489" y="1119773"/>
-            <a:ext cx="3716147" cy="646331"/>
-          </a:xfrm>
-          <a:prstGeom prst="rect">
-            <a:avLst/>
-          </a:prstGeom>
-          <a:noFill/>
-        </p:spPr>
-        <p:txBody>
-          <a:bodyPr wrap="square" rtlCol="0">
-            <a:spAutoFit/>
-          </a:bodyPr>
-          <a:lstStyle/>
-          <a:p>
-            <a:pPr marL="171450" indent="-171450">
-              <a:buFont typeface="Arial" panose="020B0604020202020204" pitchFamily="34" charset="0"/>
-              <a:buChar char="•"/>
-            </a:pPr>
-            <a:r>
-              <a:rPr lang="pt-BR" sz="1200" dirty="0">
-                <a:latin typeface="Roboto" panose="02000000000000000000" pitchFamily="2" charset="0"/>
-                <a:ea typeface="Roboto" panose="02000000000000000000" pitchFamily="2" charset="0"/>
-              </a:rPr>
-              <a:t>Static layout and limited responses (hard coded margins using x and y offset</a:t>
-            </a:r>
-          </a:p>
-          <a:p>
-            <a:pPr marL="171450" indent="-171450">
-              <a:buFont typeface="Arial" panose="020B0604020202020204" pitchFamily="34" charset="0"/>
-              <a:buChar char="•"/>
-            </a:pPr>
-            <a:r>
-              <a:rPr lang="pt-BR" sz="1200" dirty="0">
-                <a:latin typeface="Roboto" panose="02000000000000000000" pitchFamily="2" charset="0"/>
-                <a:ea typeface="Roboto" panose="02000000000000000000" pitchFamily="2" charset="0"/>
-              </a:rPr>
-              <a:t>Binary gender limitation</a:t>
-            </a:r>
-          </a:p>
-        </p:txBody>
-      </p:sp>
-      <p:sp>
-        <p:nvSpPr>
-          <p:cNvPr id="4" name="TextBox 3">
-            <a:extLst>
-              <a:ext uri="{FF2B5EF4-FFF2-40B4-BE49-F238E27FC236}">
-                <a16:creationId xmlns:a16="http://schemas.microsoft.com/office/drawing/2014/main" id="{52249EA3-8FDF-F740-AC03-0780BB7010CB}"/>
-              </a:ext>
-            </a:extLst>
-          </p:cNvPr>
-          <p:cNvSpPr txBox="1"/>
-          <p:nvPr/>
-        </p:nvSpPr>
-        <p:spPr>
-          <a:xfrm>
-            <a:off x="284629" y="3741350"/>
-            <a:ext cx="3954112" cy="830997"/>
-          </a:xfrm>
-          <a:prstGeom prst="rect">
-            <a:avLst/>
-          </a:prstGeom>
-          <a:noFill/>
-        </p:spPr>
-        <p:txBody>
-          <a:bodyPr wrap="square" rtlCol="0">
-            <a:spAutoFit/>
-          </a:bodyPr>
-          <a:lstStyle/>
-          <a:p>
-            <a:pPr marL="171450" indent="-171450">
-              <a:buFont typeface="Arial" panose="020B0604020202020204" pitchFamily="34" charset="0"/>
-              <a:buChar char="•"/>
-            </a:pPr>
-            <a:r>
-              <a:rPr lang="pt-BR" sz="1200" dirty="0">
-                <a:latin typeface="Roboto" panose="02000000000000000000" pitchFamily="2" charset="0"/>
-                <a:ea typeface="Roboto" panose="02000000000000000000" pitchFamily="2" charset="0"/>
-              </a:rPr>
-              <a:t>Limited scalability</a:t>
-            </a:r>
-          </a:p>
-          <a:p>
-            <a:pPr marL="171450" indent="-171450">
-              <a:buFont typeface="Arial" panose="020B0604020202020204" pitchFamily="34" charset="0"/>
-              <a:buChar char="•"/>
-            </a:pPr>
-            <a:r>
-              <a:rPr lang="pt-BR" sz="1200" dirty="0">
-                <a:latin typeface="Roboto" panose="02000000000000000000" pitchFamily="2" charset="0"/>
-                <a:ea typeface="Roboto" panose="02000000000000000000" pitchFamily="2" charset="0"/>
-              </a:rPr>
-              <a:t>Exclusion risks due gender</a:t>
-            </a:r>
-          </a:p>
-          <a:p>
-            <a:pPr marL="171450" indent="-171450">
-              <a:buFont typeface="Arial" panose="020B0604020202020204" pitchFamily="34" charset="0"/>
-              <a:buChar char="•"/>
-            </a:pPr>
-            <a:r>
-              <a:rPr lang="pt-BR" sz="1200" dirty="0">
-                <a:latin typeface="Roboto" panose="02000000000000000000" pitchFamily="2" charset="0"/>
-                <a:ea typeface="Roboto" panose="02000000000000000000" pitchFamily="2" charset="0"/>
-              </a:rPr>
-              <a:t>Framework limitation since using p5.js (face constraints in enterprise level web applications)</a:t>
-            </a:r>
-          </a:p>
-        </p:txBody>
-      </p:sp>
-      <p:sp>
-        <p:nvSpPr>
-          <p:cNvPr id="9" name="TextBox 8">
-            <a:extLst>
-              <a:ext uri="{FF2B5EF4-FFF2-40B4-BE49-F238E27FC236}">
-                <a16:creationId xmlns:a16="http://schemas.microsoft.com/office/drawing/2014/main" id="{3BDE4C7F-85B6-1527-9EA5-49C46E36A19C}"/>
-              </a:ext>
-            </a:extLst>
-          </p:cNvPr>
-          <p:cNvSpPr txBox="1"/>
-          <p:nvPr/>
-        </p:nvSpPr>
-        <p:spPr>
-          <a:xfrm>
-            <a:off x="8440170" y="3707243"/>
-            <a:ext cx="3659466" cy="830997"/>
-          </a:xfrm>
-          <a:prstGeom prst="rect">
-            <a:avLst/>
-          </a:prstGeom>
-          <a:noFill/>
-        </p:spPr>
-        <p:txBody>
-          <a:bodyPr wrap="square" rtlCol="0">
-            <a:spAutoFit/>
-          </a:bodyPr>
-          <a:lstStyle/>
-          <a:p>
-            <a:pPr marL="171450" indent="-171450">
-              <a:buFont typeface="Arial" panose="020B0604020202020204" pitchFamily="34" charset="0"/>
-              <a:buChar char="•"/>
-            </a:pPr>
-            <a:r>
-              <a:rPr lang="pt-BR" sz="1200" dirty="0">
-                <a:latin typeface="Roboto" panose="02000000000000000000" pitchFamily="2" charset="0"/>
-                <a:ea typeface="Roboto" panose="02000000000000000000" pitchFamily="2" charset="0"/>
-              </a:rPr>
-              <a:t>Implement hover based legends and tooltips</a:t>
-            </a:r>
-          </a:p>
-          <a:p>
-            <a:pPr marL="171450" indent="-171450">
-              <a:buFont typeface="Arial" panose="020B0604020202020204" pitchFamily="34" charset="0"/>
-              <a:buChar char="•"/>
-            </a:pPr>
-            <a:r>
-              <a:rPr lang="pt-BR" sz="1200" dirty="0">
-                <a:latin typeface="Roboto" panose="02000000000000000000" pitchFamily="2" charset="0"/>
-                <a:ea typeface="Roboto" panose="02000000000000000000" pitchFamily="2" charset="0"/>
-              </a:rPr>
-              <a:t>Personalize color palette</a:t>
-            </a:r>
-          </a:p>
-          <a:p>
-            <a:pPr marL="171450" indent="-171450">
-              <a:buFont typeface="Arial" panose="020B0604020202020204" pitchFamily="34" charset="0"/>
-              <a:buChar char="•"/>
-            </a:pPr>
-            <a:r>
-              <a:rPr lang="pt-BR" sz="1200" dirty="0">
-                <a:latin typeface="Roboto" panose="02000000000000000000" pitchFamily="2" charset="0"/>
-                <a:ea typeface="Roboto" panose="02000000000000000000" pitchFamily="2" charset="0"/>
-              </a:rPr>
-              <a:t>Customize stacked columns to improve visualization</a:t>
-            </a:r>
-          </a:p>
-        </p:txBody>
-      </p:sp>
-    </p:spTree>
-    <p:extLst>
-      <p:ext uri="{BB962C8B-B14F-4D97-AF65-F5344CB8AC3E}">
-        <p14:creationId xmlns:p14="http://schemas.microsoft.com/office/powerpoint/2010/main" val="2278949207"/>
       </p:ext>
     </p:extLst>
   </p:cSld>

</xml_diff>